<commit_message>
Power point finished need to make talking point flash cards
</commit_message>
<xml_diff>
--- a/Power_Point/The Great Acceleration.pptx
+++ b/Power_Point/The Great Acceleration.pptx
@@ -8,7 +8,7 @@
     <p:sldId id="256" r:id="rId2"/>
     <p:sldId id="257" r:id="rId3"/>
     <p:sldId id="258" r:id="rId4"/>
-    <p:sldId id="259" r:id="rId5"/>
+    <p:sldId id="270" r:id="rId5"/>
     <p:sldId id="260" r:id="rId6"/>
     <p:sldId id="261" r:id="rId7"/>
     <p:sldId id="269" r:id="rId8"/>
@@ -18,7 +18,8 @@
     <p:sldId id="264" r:id="rId12"/>
     <p:sldId id="266" r:id="rId13"/>
     <p:sldId id="267" r:id="rId14"/>
-    <p:sldId id="268" r:id="rId15"/>
+    <p:sldId id="271" r:id="rId15"/>
+    <p:sldId id="268" r:id="rId16"/>
   </p:sldIdLst>
   <p:sldSz cx="12192000" cy="6858000"/>
   <p:notesSz cx="6858000" cy="9144000"/>
@@ -117,6 +118,11 @@
       </a:defRPr>
     </a:lvl9pPr>
   </p:defaultTextStyle>
+  <p:extLst>
+    <p:ext uri="{EFAFB233-063F-42B5-8137-9DF3F51BA10A}">
+      <p15:sldGuideLst xmlns:p15="http://schemas.microsoft.com/office/powerpoint/2012/main"/>
+    </p:ext>
+  </p:extLst>
 </p:presentation>
 </file>
 
@@ -306,7 +312,7 @@
           <a:p>
             <a:fld id="{58201DAA-B5A1-427F-9C09-5A976EC72888}" type="datetimeFigureOut">
               <a:rPr lang="en-US" smtClean="0"/>
-              <a:t>6/16/2020</a:t>
+              <a:t>6/17/2020</a:t>
             </a:fld>
             <a:endParaRPr lang="en-US"/>
           </a:p>
@@ -581,7 +587,7 @@
           <a:p>
             <a:fld id="{58201DAA-B5A1-427F-9C09-5A976EC72888}" type="datetimeFigureOut">
               <a:rPr lang="en-US" smtClean="0"/>
-              <a:t>6/16/2020</a:t>
+              <a:t>6/17/2020</a:t>
             </a:fld>
             <a:endParaRPr lang="en-US"/>
           </a:p>
@@ -775,7 +781,7 @@
           <a:p>
             <a:fld id="{58201DAA-B5A1-427F-9C09-5A976EC72888}" type="datetimeFigureOut">
               <a:rPr lang="en-US" smtClean="0"/>
-              <a:t>6/16/2020</a:t>
+              <a:t>6/17/2020</a:t>
             </a:fld>
             <a:endParaRPr lang="en-US"/>
           </a:p>
@@ -1048,7 +1054,7 @@
           <a:p>
             <a:fld id="{58201DAA-B5A1-427F-9C09-5A976EC72888}" type="datetimeFigureOut">
               <a:rPr lang="en-US" smtClean="0"/>
-              <a:t>6/16/2020</a:t>
+              <a:t>6/17/2020</a:t>
             </a:fld>
             <a:endParaRPr lang="en-US"/>
           </a:p>
@@ -1389,7 +1395,7 @@
           <a:p>
             <a:fld id="{58201DAA-B5A1-427F-9C09-5A976EC72888}" type="datetimeFigureOut">
               <a:rPr lang="en-US" smtClean="0"/>
-              <a:t>6/16/2020</a:t>
+              <a:t>6/17/2020</a:t>
             </a:fld>
             <a:endParaRPr lang="en-US"/>
           </a:p>
@@ -2012,7 +2018,7 @@
           <a:p>
             <a:fld id="{58201DAA-B5A1-427F-9C09-5A976EC72888}" type="datetimeFigureOut">
               <a:rPr lang="en-US" smtClean="0"/>
-              <a:t>6/16/2020</a:t>
+              <a:t>6/17/2020</a:t>
             </a:fld>
             <a:endParaRPr lang="en-US"/>
           </a:p>
@@ -2872,7 +2878,7 @@
           <a:p>
             <a:fld id="{58201DAA-B5A1-427F-9C09-5A976EC72888}" type="datetimeFigureOut">
               <a:rPr lang="en-US" smtClean="0"/>
-              <a:t>6/16/2020</a:t>
+              <a:t>6/17/2020</a:t>
             </a:fld>
             <a:endParaRPr lang="en-US"/>
           </a:p>
@@ -3042,7 +3048,7 @@
           <a:p>
             <a:fld id="{58201DAA-B5A1-427F-9C09-5A976EC72888}" type="datetimeFigureOut">
               <a:rPr lang="en-US" smtClean="0"/>
-              <a:t>6/16/2020</a:t>
+              <a:t>6/17/2020</a:t>
             </a:fld>
             <a:endParaRPr lang="en-US"/>
           </a:p>
@@ -3222,7 +3228,7 @@
           <a:p>
             <a:fld id="{58201DAA-B5A1-427F-9C09-5A976EC72888}" type="datetimeFigureOut">
               <a:rPr lang="en-US" smtClean="0"/>
-              <a:t>6/16/2020</a:t>
+              <a:t>6/17/2020</a:t>
             </a:fld>
             <a:endParaRPr lang="en-US"/>
           </a:p>
@@ -3392,7 +3398,7 @@
           <a:p>
             <a:fld id="{58201DAA-B5A1-427F-9C09-5A976EC72888}" type="datetimeFigureOut">
               <a:rPr lang="en-US" smtClean="0"/>
-              <a:t>6/16/2020</a:t>
+              <a:t>6/17/2020</a:t>
             </a:fld>
             <a:endParaRPr lang="en-US"/>
           </a:p>
@@ -3639,7 +3645,7 @@
           <a:p>
             <a:fld id="{58201DAA-B5A1-427F-9C09-5A976EC72888}" type="datetimeFigureOut">
               <a:rPr lang="en-US" smtClean="0"/>
-              <a:t>6/16/2020</a:t>
+              <a:t>6/17/2020</a:t>
             </a:fld>
             <a:endParaRPr lang="en-US"/>
           </a:p>
@@ -3931,7 +3937,7 @@
           <a:p>
             <a:fld id="{58201DAA-B5A1-427F-9C09-5A976EC72888}" type="datetimeFigureOut">
               <a:rPr lang="en-US" smtClean="0"/>
-              <a:t>6/16/2020</a:t>
+              <a:t>6/17/2020</a:t>
             </a:fld>
             <a:endParaRPr lang="en-US"/>
           </a:p>
@@ -4375,7 +4381,7 @@
           <a:p>
             <a:fld id="{58201DAA-B5A1-427F-9C09-5A976EC72888}" type="datetimeFigureOut">
               <a:rPr lang="en-US" smtClean="0"/>
-              <a:t>6/16/2020</a:t>
+              <a:t>6/17/2020</a:t>
             </a:fld>
             <a:endParaRPr lang="en-US"/>
           </a:p>
@@ -4493,7 +4499,7 @@
           <a:p>
             <a:fld id="{58201DAA-B5A1-427F-9C09-5A976EC72888}" type="datetimeFigureOut">
               <a:rPr lang="en-US" smtClean="0"/>
-              <a:t>6/16/2020</a:t>
+              <a:t>6/17/2020</a:t>
             </a:fld>
             <a:endParaRPr lang="en-US"/>
           </a:p>
@@ -4588,7 +4594,7 @@
           <a:p>
             <a:fld id="{58201DAA-B5A1-427F-9C09-5A976EC72888}" type="datetimeFigureOut">
               <a:rPr lang="en-US" smtClean="0"/>
-              <a:t>6/16/2020</a:t>
+              <a:t>6/17/2020</a:t>
             </a:fld>
             <a:endParaRPr lang="en-US"/>
           </a:p>
@@ -4867,7 +4873,7 @@
           <a:p>
             <a:fld id="{58201DAA-B5A1-427F-9C09-5A976EC72888}" type="datetimeFigureOut">
               <a:rPr lang="en-US" smtClean="0"/>
-              <a:t>6/16/2020</a:t>
+              <a:t>6/17/2020</a:t>
             </a:fld>
             <a:endParaRPr lang="en-US"/>
           </a:p>
@@ -5142,7 +5148,7 @@
           <a:p>
             <a:fld id="{58201DAA-B5A1-427F-9C09-5A976EC72888}" type="datetimeFigureOut">
               <a:rPr lang="en-US" smtClean="0"/>
-              <a:t>6/16/2020</a:t>
+              <a:t>6/17/2020</a:t>
             </a:fld>
             <a:endParaRPr lang="en-US"/>
           </a:p>
@@ -5571,7 +5577,7 @@
           <a:p>
             <a:fld id="{58201DAA-B5A1-427F-9C09-5A976EC72888}" type="datetimeFigureOut">
               <a:rPr lang="en-US" smtClean="0"/>
-              <a:t>6/16/2020</a:t>
+              <a:t>6/17/2020</a:t>
             </a:fld>
             <a:endParaRPr lang="en-US"/>
           </a:p>
@@ -6214,31 +6220,41 @@
           </a:p>
         </p:txBody>
       </p:sp>
-      <p:sp>
-        <p:nvSpPr>
-          <p:cNvPr id="3" name="Content Placeholder 2">
+      <p:pic>
+        <p:nvPicPr>
+          <p:cNvPr id="8" name="Content Placeholder 7" descr="A screenshot of a cell phone&#10;&#10;Description automatically generated">
             <a:extLst>
               <a:ext uri="{FF2B5EF4-FFF2-40B4-BE49-F238E27FC236}">
-                <a16:creationId xmlns:a16="http://schemas.microsoft.com/office/drawing/2014/main" id="{F8BE805B-1F30-4A79-99F3-B016BBE598D1}"/>
+                <a16:creationId xmlns:a16="http://schemas.microsoft.com/office/drawing/2014/main" id="{45B331A1-011D-471F-8197-1E8CC9886DA4}"/>
               </a:ext>
             </a:extLst>
           </p:cNvPr>
-          <p:cNvSpPr>
-            <a:spLocks noGrp="1"/>
-          </p:cNvSpPr>
+          <p:cNvPicPr>
+            <a:picLocks noGrp="1" noChangeAspect="1"/>
+          </p:cNvPicPr>
           <p:nvPr>
             <p:ph idx="1"/>
           </p:nvPr>
-        </p:nvSpPr>
-        <p:spPr/>
-        <p:txBody>
-          <a:bodyPr/>
-          <a:lstStyle/>
-          <a:p>
-            <a:endParaRPr lang="en-US"/>
-          </a:p>
-        </p:txBody>
-      </p:sp>
+        </p:nvPicPr>
+        <p:blipFill>
+          <a:blip r:embed="rId2">
+            <a:extLst>
+              <a:ext uri="{28A0092B-C50C-407E-A947-70E740481C1C}">
+                <a14:useLocalDpi xmlns:a14="http://schemas.microsoft.com/office/drawing/2010/main" val="0"/>
+              </a:ext>
+            </a:extLst>
+          </a:blip>
+          <a:stretch>
+            <a:fillRect/>
+          </a:stretch>
+        </p:blipFill>
+        <p:spPr>
+          <a:xfrm>
+            <a:off x="1917578" y="2043760"/>
+            <a:ext cx="8132538" cy="4195762"/>
+          </a:xfrm>
+        </p:spPr>
+      </p:pic>
     </p:spTree>
     <p:extLst>
       <p:ext uri="{BB962C8B-B14F-4D97-AF65-F5344CB8AC3E}">
@@ -6298,31 +6314,41 @@
           </a:p>
         </p:txBody>
       </p:sp>
-      <p:sp>
-        <p:nvSpPr>
-          <p:cNvPr id="3" name="Content Placeholder 2">
+      <p:pic>
+        <p:nvPicPr>
+          <p:cNvPr id="8" name="Content Placeholder 7" descr="A screenshot of a cell phone&#10;&#10;Description automatically generated">
             <a:extLst>
               <a:ext uri="{FF2B5EF4-FFF2-40B4-BE49-F238E27FC236}">
-                <a16:creationId xmlns:a16="http://schemas.microsoft.com/office/drawing/2014/main" id="{D20497A9-2DBB-4FD1-9583-6EFE7A085663}"/>
+                <a16:creationId xmlns:a16="http://schemas.microsoft.com/office/drawing/2014/main" id="{53605C27-22CB-49DB-ABC7-872CA35C6743}"/>
               </a:ext>
             </a:extLst>
           </p:cNvPr>
-          <p:cNvSpPr>
-            <a:spLocks noGrp="1"/>
-          </p:cNvSpPr>
+          <p:cNvPicPr>
+            <a:picLocks noGrp="1" noChangeAspect="1"/>
+          </p:cNvPicPr>
           <p:nvPr>
             <p:ph idx="1"/>
           </p:nvPr>
-        </p:nvSpPr>
-        <p:spPr/>
-        <p:txBody>
-          <a:bodyPr/>
-          <a:lstStyle/>
-          <a:p>
-            <a:endParaRPr lang="en-US"/>
-          </a:p>
-        </p:txBody>
-      </p:sp>
+        </p:nvPicPr>
+        <p:blipFill>
+          <a:blip r:embed="rId2">
+            <a:extLst>
+              <a:ext uri="{28A0092B-C50C-407E-A947-70E740481C1C}">
+                <a14:useLocalDpi xmlns:a14="http://schemas.microsoft.com/office/drawing/2010/main" val="0"/>
+              </a:ext>
+            </a:extLst>
+          </a:blip>
+          <a:stretch>
+            <a:fillRect/>
+          </a:stretch>
+        </p:blipFill>
+        <p:spPr>
+          <a:xfrm>
+            <a:off x="1908699" y="2043760"/>
+            <a:ext cx="8142135" cy="4195762"/>
+          </a:xfrm>
+        </p:spPr>
+      </p:pic>
     </p:spTree>
     <p:extLst>
       <p:ext uri="{BB962C8B-B14F-4D97-AF65-F5344CB8AC3E}">
@@ -6377,7 +6403,7 @@
             <a:pPr algn="ctr"/>
             <a:r>
               <a:rPr lang="en-US" dirty="0"/>
-              <a:t>Green House Gas Inventory</a:t>
+              <a:t>Sources of Green House Gas</a:t>
             </a:r>
           </a:p>
         </p:txBody>
@@ -6398,45 +6424,68 @@
             <p:ph idx="1"/>
           </p:nvPr>
         </p:nvSpPr>
-        <p:spPr/>
-        <p:txBody>
-          <a:bodyPr/>
+        <p:spPr>
+          <a:xfrm>
+            <a:off x="1071263" y="2052918"/>
+            <a:ext cx="8946541" cy="4195481"/>
+          </a:xfrm>
+        </p:spPr>
+        <p:txBody>
+          <a:bodyPr>
+            <a:normAutofit/>
+          </a:bodyPr>
           <a:lstStyle/>
           <a:p>
             <a:r>
               <a:rPr lang="en-US" dirty="0"/>
-              <a:t>1</a:t>
-            </a:r>
+              <a:t>Coal (electricity and steel production)</a:t>
+            </a:r>
+          </a:p>
+          <a:p>
+            <a:endParaRPr lang="en-US" dirty="0"/>
           </a:p>
           <a:p>
             <a:r>
               <a:rPr lang="en-US" dirty="0"/>
-              <a:t>2</a:t>
-            </a:r>
-          </a:p>
-          <a:p>
+              <a:t>Oil (transportation)</a:t>
+            </a:r>
+          </a:p>
+          <a:p>
+            <a:endParaRPr lang="en-US" dirty="0"/>
+          </a:p>
+          <a:p>
+            <a:r>
+              <a:rPr lang="en-US" dirty="0" err="1"/>
+              <a:t>Natrual</a:t>
+            </a:r>
             <a:r>
               <a:rPr lang="en-US" dirty="0"/>
-              <a:t>3</a:t>
-            </a:r>
+              <a:t> Gas (electricity and industry)</a:t>
+            </a:r>
+          </a:p>
+          <a:p>
+            <a:endParaRPr lang="en-US" dirty="0"/>
           </a:p>
           <a:p>
             <a:r>
               <a:rPr lang="en-US" dirty="0"/>
-              <a:t>4</a:t>
-            </a:r>
+              <a:t>Cement (infrastructure)</a:t>
+            </a:r>
+          </a:p>
+          <a:p>
+            <a:endParaRPr lang="en-US" dirty="0"/>
           </a:p>
           <a:p>
             <a:r>
               <a:rPr lang="en-US" dirty="0"/>
-              <a:t>5</a:t>
-            </a:r>
-          </a:p>
-          <a:p>
-            <a:r>
-              <a:rPr lang="en-US" dirty="0"/>
-              <a:t>6</a:t>
-            </a:r>
+              <a:t>Flaring (crude oil extraction)</a:t>
+            </a:r>
+          </a:p>
+          <a:p>
+            <a:pPr marL="0" indent="0">
+              <a:buNone/>
+            </a:pPr>
+            <a:endParaRPr lang="en-US" dirty="0"/>
           </a:p>
         </p:txBody>
       </p:sp>
@@ -6515,27 +6564,91 @@
             <p:ph idx="1"/>
           </p:nvPr>
         </p:nvSpPr>
-        <p:spPr/>
-        <p:txBody>
-          <a:bodyPr/>
+        <p:spPr>
+          <a:xfrm>
+            <a:off x="1622729" y="1455938"/>
+            <a:ext cx="8946541" cy="5402062"/>
+          </a:xfrm>
+        </p:spPr>
+        <p:txBody>
+          <a:bodyPr>
+            <a:normAutofit/>
+          </a:bodyPr>
           <a:lstStyle/>
           <a:p>
             <a:r>
               <a:rPr lang="en-US" dirty="0"/>
-              <a:t>There is a correlation with the timelines</a:t>
+              <a:t>When carbon emissions rapidly increased, earths climate began to change at a faster rate. </a:t>
             </a:r>
           </a:p>
           <a:p>
             <a:r>
               <a:rPr lang="en-US" dirty="0"/>
-              <a:t>Reiterate the top 5 countries</a:t>
-            </a:r>
+              <a:t>This rapid increase in carbon emissions is largely due to the demands created from an increasing global population. (The Great Acceleration)</a:t>
+            </a:r>
+          </a:p>
+          <a:p>
+            <a:endParaRPr lang="en-US" dirty="0"/>
+          </a:p>
+          <a:p>
+            <a:pPr marL="0" indent="0">
+              <a:buNone/>
+            </a:pPr>
+            <a:endParaRPr lang="en-US" dirty="0"/>
           </a:p>
           <a:p>
             <a:r>
               <a:rPr lang="en-US" dirty="0"/>
-              <a:t>List off the top industries that contribute the most carbon</a:t>
-            </a:r>
+              <a:t>Top five sources of carbon emissions:</a:t>
+            </a:r>
+          </a:p>
+          <a:p>
+            <a:pPr marL="0" indent="0">
+              <a:buNone/>
+            </a:pPr>
+            <a:r>
+              <a:rPr lang="en-US" dirty="0"/>
+              <a:t>	Coal (electricity and steel production)</a:t>
+            </a:r>
+          </a:p>
+          <a:p>
+            <a:pPr marL="0" indent="0">
+              <a:buNone/>
+            </a:pPr>
+            <a:r>
+              <a:rPr lang="en-US" dirty="0"/>
+              <a:t>	Oil (transportation)</a:t>
+            </a:r>
+          </a:p>
+          <a:p>
+            <a:pPr marL="0" indent="0">
+              <a:buNone/>
+            </a:pPr>
+            <a:r>
+              <a:rPr lang="en-US" dirty="0"/>
+              <a:t>	Gas (electricity and industry)</a:t>
+            </a:r>
+          </a:p>
+          <a:p>
+            <a:pPr marL="0" indent="0">
+              <a:buNone/>
+            </a:pPr>
+            <a:r>
+              <a:rPr lang="en-US" dirty="0"/>
+              <a:t>	Cement (infrastructure)</a:t>
+            </a:r>
+          </a:p>
+          <a:p>
+            <a:pPr marL="0" indent="0">
+              <a:buNone/>
+            </a:pPr>
+            <a:r>
+              <a:rPr lang="en-US" dirty="0"/>
+              <a:t>	Flaring (crude oil extraction)</a:t>
+            </a:r>
+          </a:p>
+          <a:p>
+            <a:endParaRPr lang="en-US" dirty="0"/>
           </a:p>
           <a:p>
             <a:endParaRPr lang="en-US" dirty="0"/>
@@ -6577,6 +6690,203 @@
           <p:cNvPr id="2" name="Title 1">
             <a:extLst>
               <a:ext uri="{FF2B5EF4-FFF2-40B4-BE49-F238E27FC236}">
+                <a16:creationId xmlns:a16="http://schemas.microsoft.com/office/drawing/2014/main" id="{1E7B8D60-8AEF-499B-85DF-1EB141C8DEF7}"/>
+              </a:ext>
+            </a:extLst>
+          </p:cNvPr>
+          <p:cNvSpPr>
+            <a:spLocks noGrp="1"/>
+          </p:cNvSpPr>
+          <p:nvPr>
+            <p:ph type="title"/>
+          </p:nvPr>
+        </p:nvSpPr>
+        <p:spPr/>
+        <p:txBody>
+          <a:bodyPr/>
+          <a:lstStyle/>
+          <a:p>
+            <a:pPr algn="ctr"/>
+            <a:r>
+              <a:rPr lang="en-US" dirty="0"/>
+              <a:t>Conclusion cont.</a:t>
+            </a:r>
+          </a:p>
+        </p:txBody>
+      </p:sp>
+      <p:sp>
+        <p:nvSpPr>
+          <p:cNvPr id="3" name="Content Placeholder 2">
+            <a:extLst>
+              <a:ext uri="{FF2B5EF4-FFF2-40B4-BE49-F238E27FC236}">
+                <a16:creationId xmlns:a16="http://schemas.microsoft.com/office/drawing/2014/main" id="{B5C6B285-FAB2-47A1-80DE-F94D6A4E77C1}"/>
+              </a:ext>
+            </a:extLst>
+          </p:cNvPr>
+          <p:cNvSpPr>
+            <a:spLocks noGrp="1"/>
+          </p:cNvSpPr>
+          <p:nvPr>
+            <p:ph idx="1"/>
+          </p:nvPr>
+        </p:nvSpPr>
+        <p:spPr/>
+        <p:txBody>
+          <a:bodyPr/>
+          <a:lstStyle/>
+          <a:p>
+            <a:pPr lvl="0">
+              <a:buClr>
+                <a:srgbClr val="1E5155">
+                  <a:lumMod val="40000"/>
+                  <a:lumOff val="60000"/>
+                </a:srgbClr>
+              </a:buClr>
+            </a:pPr>
+            <a:r>
+              <a:rPr lang="en-US" sz="1700" dirty="0">
+                <a:solidFill>
+                  <a:prstClr val="white"/>
+                </a:solidFill>
+              </a:rPr>
+              <a:t>The top five emitters are: </a:t>
+            </a:r>
+          </a:p>
+          <a:p>
+            <a:pPr marL="0" lvl="0" indent="0">
+              <a:buClr>
+                <a:srgbClr val="1E5155">
+                  <a:lumMod val="40000"/>
+                  <a:lumOff val="60000"/>
+                </a:srgbClr>
+              </a:buClr>
+              <a:buNone/>
+            </a:pPr>
+            <a:r>
+              <a:rPr lang="en-US" sz="1700" dirty="0">
+                <a:solidFill>
+                  <a:prstClr val="white"/>
+                </a:solidFill>
+              </a:rPr>
+              <a:t>	United States</a:t>
+            </a:r>
+          </a:p>
+          <a:p>
+            <a:pPr marL="0" lvl="0" indent="0">
+              <a:buClr>
+                <a:srgbClr val="1E5155">
+                  <a:lumMod val="40000"/>
+                  <a:lumOff val="60000"/>
+                </a:srgbClr>
+              </a:buClr>
+              <a:buNone/>
+            </a:pPr>
+            <a:r>
+              <a:rPr lang="en-US" sz="1700" dirty="0">
+                <a:solidFill>
+                  <a:prstClr val="white"/>
+                </a:solidFill>
+              </a:rPr>
+              <a:t>	China</a:t>
+            </a:r>
+          </a:p>
+          <a:p>
+            <a:pPr marL="0" lvl="0" indent="0">
+              <a:buClr>
+                <a:srgbClr val="1E5155">
+                  <a:lumMod val="40000"/>
+                  <a:lumOff val="60000"/>
+                </a:srgbClr>
+              </a:buClr>
+              <a:buNone/>
+            </a:pPr>
+            <a:r>
+              <a:rPr lang="en-US" sz="1700" dirty="0">
+                <a:solidFill>
+                  <a:prstClr val="white"/>
+                </a:solidFill>
+              </a:rPr>
+              <a:t>	Russia</a:t>
+            </a:r>
+          </a:p>
+          <a:p>
+            <a:pPr marL="0" lvl="0" indent="0">
+              <a:buClr>
+                <a:srgbClr val="1E5155">
+                  <a:lumMod val="40000"/>
+                  <a:lumOff val="60000"/>
+                </a:srgbClr>
+              </a:buClr>
+              <a:buNone/>
+            </a:pPr>
+            <a:r>
+              <a:rPr lang="en-US" sz="1700" dirty="0">
+                <a:solidFill>
+                  <a:prstClr val="white"/>
+                </a:solidFill>
+              </a:rPr>
+              <a:t>	Germany</a:t>
+            </a:r>
+          </a:p>
+          <a:p>
+            <a:pPr marL="0" lvl="0" indent="0">
+              <a:buClr>
+                <a:srgbClr val="1E5155">
+                  <a:lumMod val="40000"/>
+                  <a:lumOff val="60000"/>
+                </a:srgbClr>
+              </a:buClr>
+              <a:buNone/>
+            </a:pPr>
+            <a:r>
+              <a:rPr lang="en-US" sz="1700" dirty="0">
+                <a:solidFill>
+                  <a:prstClr val="white"/>
+                </a:solidFill>
+              </a:rPr>
+              <a:t>	Japan</a:t>
+            </a:r>
+          </a:p>
+          <a:p>
+            <a:endParaRPr lang="en-US" dirty="0"/>
+          </a:p>
+        </p:txBody>
+      </p:sp>
+    </p:spTree>
+    <p:extLst>
+      <p:ext uri="{BB962C8B-B14F-4D97-AF65-F5344CB8AC3E}">
+        <p14:creationId xmlns:p14="http://schemas.microsoft.com/office/powerpoint/2010/main" val="3732853800"/>
+      </p:ext>
+    </p:extLst>
+  </p:cSld>
+  <p:clrMapOvr>
+    <a:masterClrMapping/>
+  </p:clrMapOvr>
+</p:sld>
+</file>
+
+<file path=ppt/slides/slide15.xml><?xml version="1.0" encoding="utf-8"?>
+<p:sld xmlns:a="http://schemas.openxmlformats.org/drawingml/2006/main" xmlns:r="http://schemas.openxmlformats.org/officeDocument/2006/relationships" xmlns:p="http://schemas.openxmlformats.org/presentationml/2006/main">
+  <p:cSld>
+    <p:spTree>
+      <p:nvGrpSpPr>
+        <p:cNvPr id="1" name=""/>
+        <p:cNvGrpSpPr/>
+        <p:nvPr/>
+      </p:nvGrpSpPr>
+      <p:grpSpPr>
+        <a:xfrm>
+          <a:off x="0" y="0"/>
+          <a:ext cx="0" cy="0"/>
+          <a:chOff x="0" y="0"/>
+          <a:chExt cx="0" cy="0"/>
+        </a:xfrm>
+      </p:grpSpPr>
+      <p:sp>
+        <p:nvSpPr>
+          <p:cNvPr id="2" name="Title 1">
+            <a:extLst>
+              <a:ext uri="{FF2B5EF4-FFF2-40B4-BE49-F238E27FC236}">
                 <a16:creationId xmlns:a16="http://schemas.microsoft.com/office/drawing/2014/main" id="{30A63A4E-64D0-4BC6-8EC6-B5365809AE8D}"/>
               </a:ext>
             </a:extLst>
@@ -6588,7 +6898,12 @@
             <p:ph type="title"/>
           </p:nvPr>
         </p:nvSpPr>
-        <p:spPr/>
+        <p:spPr>
+          <a:xfrm>
+            <a:off x="1046161" y="2110068"/>
+            <a:ext cx="9404723" cy="1137957"/>
+          </a:xfrm>
+        </p:spPr>
         <p:txBody>
           <a:bodyPr/>
           <a:lstStyle/>
@@ -6598,31 +6913,6 @@
               <a:rPr lang="en-US" dirty="0"/>
               <a:t>Questions?</a:t>
             </a:r>
-          </a:p>
-        </p:txBody>
-      </p:sp>
-      <p:sp>
-        <p:nvSpPr>
-          <p:cNvPr id="3" name="Content Placeholder 2">
-            <a:extLst>
-              <a:ext uri="{FF2B5EF4-FFF2-40B4-BE49-F238E27FC236}">
-                <a16:creationId xmlns:a16="http://schemas.microsoft.com/office/drawing/2014/main" id="{194AE214-6613-4747-88C8-1E646C1F301D}"/>
-              </a:ext>
-            </a:extLst>
-          </p:cNvPr>
-          <p:cNvSpPr>
-            <a:spLocks noGrp="1"/>
-          </p:cNvSpPr>
-          <p:nvPr>
-            <p:ph idx="1"/>
-          </p:nvPr>
-        </p:nvSpPr>
-        <p:spPr/>
-        <p:txBody>
-          <a:bodyPr/>
-          <a:lstStyle/>
-          <a:p>
-            <a:endParaRPr lang="en-US"/>
           </a:p>
         </p:txBody>
       </p:sp>
@@ -6708,19 +6998,31 @@
           <a:p>
             <a:r>
               <a:rPr lang="en-US" dirty="0"/>
-              <a:t>Is there a correlation between carbon emissions and climate change. The amount of carbon emitted has effected the rate at which the climate changes.</a:t>
-            </a:r>
+              <a:t>Is there a correlation between carbon emissions and climate change?</a:t>
+            </a:r>
+          </a:p>
+          <a:p>
+            <a:pPr marL="0" indent="0">
+              <a:buNone/>
+            </a:pPr>
+            <a:endParaRPr lang="en-US" dirty="0"/>
           </a:p>
           <a:p>
             <a:r>
               <a:rPr lang="en-US" dirty="0"/>
-              <a:t>What countries are the most responsible for the carbon emissions.</a:t>
-            </a:r>
+              <a:t>Which countries are the most responsible for the carbon emissions?</a:t>
+            </a:r>
+          </a:p>
+          <a:p>
+            <a:pPr marL="0" indent="0">
+              <a:buNone/>
+            </a:pPr>
+            <a:endParaRPr lang="en-US" dirty="0"/>
           </a:p>
           <a:p>
             <a:r>
               <a:rPr lang="en-US" dirty="0"/>
-              <a:t>What industries are producing the most carbon emissions.</a:t>
+              <a:t>What industries are producing the most carbon emissions?</a:t>
             </a:r>
           </a:p>
           <a:p>
@@ -6784,10 +7086,10 @@
       </p:grpSpPr>
       <p:sp>
         <p:nvSpPr>
-          <p:cNvPr id="8" name="Title 7">
+          <p:cNvPr id="3" name="Title 2">
             <a:extLst>
               <a:ext uri="{FF2B5EF4-FFF2-40B4-BE49-F238E27FC236}">
-                <a16:creationId xmlns:a16="http://schemas.microsoft.com/office/drawing/2014/main" id="{A82D8C1B-A110-40A5-A598-44486BB50BA9}"/>
+                <a16:creationId xmlns:a16="http://schemas.microsoft.com/office/drawing/2014/main" id="{BC1F8918-634D-4624-B3E3-476B90A32AF1}"/>
               </a:ext>
             </a:extLst>
           </p:cNvPr>
@@ -6798,21 +7100,39 @@
             <p:ph type="title"/>
           </p:nvPr>
         </p:nvSpPr>
-        <p:spPr/>
+        <p:spPr>
+          <a:xfrm>
+            <a:off x="1232037" y="333376"/>
+            <a:ext cx="9404723" cy="1400530"/>
+          </a:xfrm>
+        </p:spPr>
         <p:txBody>
           <a:bodyPr/>
           <a:lstStyle/>
           <a:p>
-            <a:endParaRPr lang="en-US"/>
+            <a:pPr algn="ctr"/>
+            <a:r>
+              <a:rPr lang="en-US" dirty="0"/>
+              <a:t>Total CO</a:t>
+            </a:r>
+            <a:r>
+              <a:rPr lang="en-US" sz="2000" dirty="0"/>
+              <a:t>2</a:t>
+            </a:r>
+            <a:r>
+              <a:rPr lang="en-US" dirty="0"/>
+              <a:t> (1751-2017)</a:t>
+            </a:r>
+            <a:endParaRPr lang="en-US" sz="1200" dirty="0"/>
           </a:p>
         </p:txBody>
       </p:sp>
       <p:pic>
         <p:nvPicPr>
-          <p:cNvPr id="7" name="Content Placeholder 6" descr="A picture containing water, table, white, black&#10;&#10;Description automatically generated">
+          <p:cNvPr id="6" name="Content Placeholder 5" descr="A close up of text on a white background&#10;&#10;Description automatically generated">
             <a:extLst>
               <a:ext uri="{FF2B5EF4-FFF2-40B4-BE49-F238E27FC236}">
-                <a16:creationId xmlns:a16="http://schemas.microsoft.com/office/drawing/2014/main" id="{CFA8F85C-DFBE-460D-814D-7AA15921A9CC}"/>
+                <a16:creationId xmlns:a16="http://schemas.microsoft.com/office/drawing/2014/main" id="{0E9926A2-301E-400A-A9AD-6A691012A51A}"/>
               </a:ext>
             </a:extLst>
           </p:cNvPr>
@@ -6820,7 +7140,7 @@
             <a:picLocks noGrp="1" noChangeAspect="1"/>
           </p:cNvPicPr>
           <p:nvPr>
-            <p:ph sz="half" idx="1"/>
+            <p:ph idx="1"/>
           </p:nvPr>
         </p:nvPicPr>
         <p:blipFill>
@@ -6837,44 +7157,11 @@
         </p:blipFill>
         <p:spPr>
           <a:xfrm>
-            <a:off x="0" y="1971675"/>
-            <a:ext cx="5905499" cy="4284662"/>
+            <a:off x="1560886" y="2066925"/>
+            <a:ext cx="8947150" cy="4457699"/>
           </a:xfrm>
-          <a:prstGeom prst="rect">
-            <a:avLst/>
-          </a:prstGeom>
         </p:spPr>
       </p:pic>
-      <p:sp>
-        <p:nvSpPr>
-          <p:cNvPr id="9" name="Content Placeholder 8">
-            <a:extLst>
-              <a:ext uri="{FF2B5EF4-FFF2-40B4-BE49-F238E27FC236}">
-                <a16:creationId xmlns:a16="http://schemas.microsoft.com/office/drawing/2014/main" id="{632B2B91-95D8-4217-B3CC-65909EFB0761}"/>
-              </a:ext>
-            </a:extLst>
-          </p:cNvPr>
-          <p:cNvSpPr>
-            <a:spLocks noGrp="1"/>
-          </p:cNvSpPr>
-          <p:nvPr>
-            <p:ph sz="half" idx="2"/>
-          </p:nvPr>
-        </p:nvSpPr>
-        <p:spPr>
-          <a:xfrm>
-            <a:off x="6181725" y="2056092"/>
-            <a:ext cx="5781675" cy="4200245"/>
-          </a:xfrm>
-        </p:spPr>
-        <p:txBody>
-          <a:bodyPr/>
-          <a:lstStyle/>
-          <a:p>
-            <a:endParaRPr lang="en-US" dirty="0"/>
-          </a:p>
-        </p:txBody>
-      </p:sp>
     </p:spTree>
     <p:extLst>
       <p:ext uri="{BB962C8B-B14F-4D97-AF65-F5344CB8AC3E}">
@@ -6910,7 +7197,7 @@
           <p:cNvPr id="2" name="Title 1">
             <a:extLst>
               <a:ext uri="{FF2B5EF4-FFF2-40B4-BE49-F238E27FC236}">
-                <a16:creationId xmlns:a16="http://schemas.microsoft.com/office/drawing/2014/main" id="{5EACD4CE-B313-477D-9900-7DBCBD1A727D}"/>
+                <a16:creationId xmlns:a16="http://schemas.microsoft.com/office/drawing/2014/main" id="{743C3AD9-3D76-4F4B-ABF8-6836C1EA85E6}"/>
               </a:ext>
             </a:extLst>
           </p:cNvPr>
@@ -6939,7 +7226,7 @@
           <p:cNvPr id="3" name="Content Placeholder 2">
             <a:extLst>
               <a:ext uri="{FF2B5EF4-FFF2-40B4-BE49-F238E27FC236}">
-                <a16:creationId xmlns:a16="http://schemas.microsoft.com/office/drawing/2014/main" id="{82B07CE8-48AC-4756-B9C3-AF83E0E39C37}"/>
+                <a16:creationId xmlns:a16="http://schemas.microsoft.com/office/drawing/2014/main" id="{AF44368A-7703-41BD-9D6A-AF1A52F5E29F}"/>
               </a:ext>
             </a:extLst>
           </p:cNvPr>
@@ -6950,26 +7237,19 @@
             <p:ph idx="1"/>
           </p:nvPr>
         </p:nvSpPr>
-        <p:spPr/>
+        <p:spPr>
+          <a:xfrm>
+            <a:off x="1422908" y="2567823"/>
+            <a:ext cx="8946541" cy="4195481"/>
+          </a:xfrm>
+        </p:spPr>
         <p:txBody>
           <a:bodyPr/>
           <a:lstStyle/>
           <a:p>
             <a:r>
               <a:rPr lang="en-US" dirty="0"/>
-              <a:t>Who? Us!!!!!</a:t>
-            </a:r>
-          </a:p>
-          <a:p>
-            <a:r>
-              <a:rPr lang="en-US" dirty="0"/>
-              <a:t>What? Dramatic continual and roughly simultaneous surge in growth rate across the globe.</a:t>
-            </a:r>
-          </a:p>
-          <a:p>
-            <a:r>
-              <a:rPr lang="en-US" dirty="0"/>
-              <a:t>When? Mid 20</a:t>
+              <a:t>Mid 20</a:t>
             </a:r>
             <a:r>
               <a:rPr lang="en-US" baseline="30000" dirty="0"/>
@@ -6981,29 +7261,41 @@
             </a:r>
           </a:p>
           <a:p>
+            <a:endParaRPr lang="en-US" dirty="0"/>
+          </a:p>
+          <a:p>
             <a:r>
               <a:rPr lang="en-US" dirty="0"/>
-              <a:t>Where? All over</a:t>
-            </a:r>
+              <a:t>Majority of countries on the planet</a:t>
+            </a:r>
+          </a:p>
+          <a:p>
+            <a:endParaRPr lang="en-US" dirty="0"/>
           </a:p>
           <a:p>
             <a:r>
               <a:rPr lang="en-US" dirty="0"/>
-              <a:t>Why? Population increase, </a:t>
-            </a:r>
+              <a:t>Exponentially increased its growth rate of progress</a:t>
+            </a:r>
+          </a:p>
+          <a:p>
+            <a:endParaRPr lang="en-US" dirty="0"/>
           </a:p>
           <a:p>
             <a:r>
               <a:rPr lang="en-US" dirty="0"/>
-              <a:t>How? Energy, Transportation, Concrete Manufacturing </a:t>
-            </a:r>
+              <a:t>Increase of burning fossil fuels (coal, oil, natural gases, etc.), concrete Manufacturing, and Flaring</a:t>
+            </a:r>
+          </a:p>
+          <a:p>
+            <a:endParaRPr lang="en-US" dirty="0"/>
           </a:p>
         </p:txBody>
       </p:sp>
     </p:spTree>
     <p:extLst>
       <p:ext uri="{BB962C8B-B14F-4D97-AF65-F5344CB8AC3E}">
-        <p14:creationId xmlns:p14="http://schemas.microsoft.com/office/powerpoint/2010/main" val="2979900802"/>
+        <p14:creationId xmlns:p14="http://schemas.microsoft.com/office/powerpoint/2010/main" val="1319324491"/>
       </p:ext>
     </p:extLst>
   </p:cSld>
@@ -7066,10 +7358,10 @@
       </p:sp>
       <p:pic>
         <p:nvPicPr>
-          <p:cNvPr id="11" name="Content Placeholder 10" descr="A close up of a map&#10;&#10;Description automatically generated">
+          <p:cNvPr id="5" name="Content Placeholder 4" descr="A close up of a map&#10;&#10;Description automatically generated">
             <a:extLst>
               <a:ext uri="{FF2B5EF4-FFF2-40B4-BE49-F238E27FC236}">
-                <a16:creationId xmlns:a16="http://schemas.microsoft.com/office/drawing/2014/main" id="{088F5623-F929-44ED-8997-D28A505BAB10}"/>
+                <a16:creationId xmlns:a16="http://schemas.microsoft.com/office/drawing/2014/main" id="{5E25C365-6524-4688-A2A6-77C087C99131}"/>
               </a:ext>
             </a:extLst>
           </p:cNvPr>
@@ -7094,8 +7386,8 @@
         </p:blipFill>
         <p:spPr>
           <a:xfrm>
-            <a:off x="1103312" y="1323974"/>
-            <a:ext cx="9678988" cy="5057775"/>
+            <a:off x="1622425" y="1800225"/>
+            <a:ext cx="8947150" cy="4805082"/>
           </a:xfrm>
         </p:spPr>
       </p:pic>
@@ -7165,10 +7457,10 @@
       </p:sp>
       <p:pic>
         <p:nvPicPr>
-          <p:cNvPr id="12" name="Content Placeholder 11" descr="A close up of a map&#10;&#10;Description automatically generated">
+          <p:cNvPr id="5" name="Content Placeholder 4" descr="A close up of a map&#10;&#10;Description automatically generated">
             <a:extLst>
               <a:ext uri="{FF2B5EF4-FFF2-40B4-BE49-F238E27FC236}">
-                <a16:creationId xmlns:a16="http://schemas.microsoft.com/office/drawing/2014/main" id="{A184A942-06D9-403C-A85F-CE3519CE07DD}"/>
+                <a16:creationId xmlns:a16="http://schemas.microsoft.com/office/drawing/2014/main" id="{3A0E35A8-F54C-40B1-B209-6F6C85A86B80}"/>
               </a:ext>
             </a:extLst>
           </p:cNvPr>
@@ -7193,17 +7485,17 @@
         </p:blipFill>
         <p:spPr>
           <a:xfrm>
-            <a:off x="114300" y="1809750"/>
-            <a:ext cx="5886449" cy="4757457"/>
+            <a:off x="504825" y="2152650"/>
+            <a:ext cx="5480051" cy="4314825"/>
           </a:xfrm>
         </p:spPr>
       </p:pic>
       <p:pic>
         <p:nvPicPr>
-          <p:cNvPr id="14" name="Content Placeholder 13" descr="A close up of a map&#10;&#10;Description automatically generated">
+          <p:cNvPr id="8" name="Content Placeholder 7" descr="A close up of a map&#10;&#10;Description automatically generated">
             <a:extLst>
               <a:ext uri="{FF2B5EF4-FFF2-40B4-BE49-F238E27FC236}">
-                <a16:creationId xmlns:a16="http://schemas.microsoft.com/office/drawing/2014/main" id="{EA63CF35-A9EA-4B45-BE61-24853892833F}"/>
+                <a16:creationId xmlns:a16="http://schemas.microsoft.com/office/drawing/2014/main" id="{AF51219A-A363-4DFB-89D1-98A0ECC79164}"/>
               </a:ext>
             </a:extLst>
           </p:cNvPr>
@@ -7228,8 +7520,8 @@
         </p:blipFill>
         <p:spPr>
           <a:xfrm>
-            <a:off x="6095999" y="1809750"/>
-            <a:ext cx="5981699" cy="4757455"/>
+            <a:off x="6207125" y="2152650"/>
+            <a:ext cx="5480050" cy="4314825"/>
           </a:xfrm>
         </p:spPr>
       </p:pic>
@@ -7279,7 +7571,12 @@
             <p:ph type="title"/>
           </p:nvPr>
         </p:nvSpPr>
-        <p:spPr/>
+        <p:spPr>
+          <a:xfrm>
+            <a:off x="1178771" y="239654"/>
+            <a:ext cx="9404723" cy="1400530"/>
+          </a:xfrm>
+        </p:spPr>
         <p:txBody>
           <a:bodyPr/>
           <a:lstStyle/>
@@ -7309,40 +7606,66 @@
         </p:nvSpPr>
         <p:spPr/>
         <p:txBody>
-          <a:bodyPr/>
+          <a:bodyPr>
+            <a:normAutofit/>
+          </a:bodyPr>
           <a:lstStyle/>
           <a:p>
             <a:r>
               <a:rPr lang="en-US" dirty="0"/>
-              <a:t>Mention types of </a:t>
-            </a:r>
-            <a:r>
-              <a:rPr lang="en-US" dirty="0" err="1"/>
-              <a:t>nd</a:t>
-            </a:r>
-            <a:endParaRPr lang="en-US" dirty="0"/>
+              <a:t>Earthquakes</a:t>
+            </a:r>
           </a:p>
           <a:p>
             <a:r>
               <a:rPr lang="en-US" dirty="0"/>
-              <a:t>Record keeping of </a:t>
-            </a:r>
-            <a:r>
-              <a:rPr lang="en-US" dirty="0" err="1"/>
-              <a:t>nd</a:t>
-            </a:r>
-            <a:endParaRPr lang="en-US" dirty="0"/>
+              <a:t>Volcanoes</a:t>
+            </a:r>
           </a:p>
           <a:p>
             <a:r>
               <a:rPr lang="en-US" dirty="0"/>
-              <a:t>Maybe how warm climate effects </a:t>
-            </a:r>
-            <a:r>
-              <a:rPr lang="en-US" dirty="0" err="1"/>
-              <a:t>nd</a:t>
-            </a:r>
-            <a:endParaRPr lang="en-US" dirty="0"/>
+              <a:t>Landslides</a:t>
+            </a:r>
+          </a:p>
+          <a:p>
+            <a:r>
+              <a:rPr lang="en-US" dirty="0"/>
+              <a:t>Droughts</a:t>
+            </a:r>
+          </a:p>
+          <a:p>
+            <a:r>
+              <a:rPr lang="en-US" dirty="0"/>
+              <a:t>Extreme Weather (Hurricanes, Tornados, Cyclones)</a:t>
+            </a:r>
+          </a:p>
+          <a:p>
+            <a:r>
+              <a:rPr lang="en-US" dirty="0"/>
+              <a:t>Floods</a:t>
+            </a:r>
+          </a:p>
+          <a:p>
+            <a:r>
+              <a:rPr lang="en-US" dirty="0"/>
+              <a:t>Extreme temperature spikes</a:t>
+            </a:r>
+          </a:p>
+          <a:p>
+            <a:r>
+              <a:rPr lang="en-US" dirty="0"/>
+              <a:t>Wildfires</a:t>
+            </a:r>
+          </a:p>
+          <a:p>
+            <a:r>
+              <a:rPr lang="en-US" dirty="0"/>
+              <a:t>Lightning</a:t>
+            </a:r>
+          </a:p>
+          <a:p>
+            <a:endParaRPr lang="en-US" u="sng" dirty="0"/>
           </a:p>
         </p:txBody>
       </p:sp>
@@ -7407,10 +7730,10 @@
       </p:sp>
       <p:pic>
         <p:nvPicPr>
-          <p:cNvPr id="8" name="Content Placeholder 7" descr="A close up of a map&#10;&#10;Description automatically generated">
+          <p:cNvPr id="5" name="Content Placeholder 4" descr="A close up of a map&#10;&#10;Description automatically generated">
             <a:extLst>
               <a:ext uri="{FF2B5EF4-FFF2-40B4-BE49-F238E27FC236}">
-                <a16:creationId xmlns:a16="http://schemas.microsoft.com/office/drawing/2014/main" id="{C847AE73-5E84-46FB-A917-0160AE1D922F}"/>
+                <a16:creationId xmlns:a16="http://schemas.microsoft.com/office/drawing/2014/main" id="{E3D3F5C8-2DD8-40EB-A342-118EA871A12C}"/>
               </a:ext>
             </a:extLst>
           </p:cNvPr>
@@ -7435,8 +7758,8 @@
         </p:blipFill>
         <p:spPr>
           <a:xfrm>
-            <a:off x="932155" y="1589102"/>
-            <a:ext cx="10014012" cy="4740677"/>
+            <a:off x="1622425" y="2041864"/>
+            <a:ext cx="8947150" cy="4283518"/>
           </a:xfrm>
         </p:spPr>
       </p:pic>
@@ -7564,8 +7887,8 @@
         </p:blipFill>
         <p:spPr>
           <a:xfrm>
-            <a:off x="6445254" y="1853248"/>
-            <a:ext cx="5413374" cy="4461826"/>
+            <a:off x="6267635" y="1853248"/>
+            <a:ext cx="5590993" cy="4461826"/>
           </a:xfrm>
         </p:spPr>
       </p:pic>

</xml_diff>

<commit_message>
cleaned up my repository
</commit_message>
<xml_diff>
--- a/Power_Point/The Great Acceleration.pptx
+++ b/Power_Point/The Great Acceleration.pptx
@@ -7,13 +7,13 @@
   <p:sldIdLst>
     <p:sldId id="256" r:id="rId2"/>
     <p:sldId id="257" r:id="rId3"/>
-    <p:sldId id="258" r:id="rId4"/>
-    <p:sldId id="270" r:id="rId5"/>
-    <p:sldId id="260" r:id="rId6"/>
-    <p:sldId id="261" r:id="rId7"/>
-    <p:sldId id="269" r:id="rId8"/>
-    <p:sldId id="262" r:id="rId9"/>
-    <p:sldId id="263" r:id="rId10"/>
+    <p:sldId id="272" r:id="rId4"/>
+    <p:sldId id="258" r:id="rId5"/>
+    <p:sldId id="270" r:id="rId6"/>
+    <p:sldId id="260" r:id="rId7"/>
+    <p:sldId id="261" r:id="rId8"/>
+    <p:sldId id="269" r:id="rId9"/>
+    <p:sldId id="262" r:id="rId10"/>
     <p:sldId id="265" r:id="rId11"/>
     <p:sldId id="264" r:id="rId12"/>
     <p:sldId id="266" r:id="rId13"/>
@@ -312,7 +312,7 @@
           <a:p>
             <a:fld id="{58201DAA-B5A1-427F-9C09-5A976EC72888}" type="datetimeFigureOut">
               <a:rPr lang="en-US" smtClean="0"/>
-              <a:t>6/17/2020</a:t>
+              <a:t>6/20/2020</a:t>
             </a:fld>
             <a:endParaRPr lang="en-US"/>
           </a:p>
@@ -587,7 +587,7 @@
           <a:p>
             <a:fld id="{58201DAA-B5A1-427F-9C09-5A976EC72888}" type="datetimeFigureOut">
               <a:rPr lang="en-US" smtClean="0"/>
-              <a:t>6/17/2020</a:t>
+              <a:t>6/20/2020</a:t>
             </a:fld>
             <a:endParaRPr lang="en-US"/>
           </a:p>
@@ -781,7 +781,7 @@
           <a:p>
             <a:fld id="{58201DAA-B5A1-427F-9C09-5A976EC72888}" type="datetimeFigureOut">
               <a:rPr lang="en-US" smtClean="0"/>
-              <a:t>6/17/2020</a:t>
+              <a:t>6/20/2020</a:t>
             </a:fld>
             <a:endParaRPr lang="en-US"/>
           </a:p>
@@ -1054,7 +1054,7 @@
           <a:p>
             <a:fld id="{58201DAA-B5A1-427F-9C09-5A976EC72888}" type="datetimeFigureOut">
               <a:rPr lang="en-US" smtClean="0"/>
-              <a:t>6/17/2020</a:t>
+              <a:t>6/20/2020</a:t>
             </a:fld>
             <a:endParaRPr lang="en-US"/>
           </a:p>
@@ -1395,7 +1395,7 @@
           <a:p>
             <a:fld id="{58201DAA-B5A1-427F-9C09-5A976EC72888}" type="datetimeFigureOut">
               <a:rPr lang="en-US" smtClean="0"/>
-              <a:t>6/17/2020</a:t>
+              <a:t>6/20/2020</a:t>
             </a:fld>
             <a:endParaRPr lang="en-US"/>
           </a:p>
@@ -2018,7 +2018,7 @@
           <a:p>
             <a:fld id="{58201DAA-B5A1-427F-9C09-5A976EC72888}" type="datetimeFigureOut">
               <a:rPr lang="en-US" smtClean="0"/>
-              <a:t>6/17/2020</a:t>
+              <a:t>6/20/2020</a:t>
             </a:fld>
             <a:endParaRPr lang="en-US"/>
           </a:p>
@@ -2878,7 +2878,7 @@
           <a:p>
             <a:fld id="{58201DAA-B5A1-427F-9C09-5A976EC72888}" type="datetimeFigureOut">
               <a:rPr lang="en-US" smtClean="0"/>
-              <a:t>6/17/2020</a:t>
+              <a:t>6/20/2020</a:t>
             </a:fld>
             <a:endParaRPr lang="en-US"/>
           </a:p>
@@ -3048,7 +3048,7 @@
           <a:p>
             <a:fld id="{58201DAA-B5A1-427F-9C09-5A976EC72888}" type="datetimeFigureOut">
               <a:rPr lang="en-US" smtClean="0"/>
-              <a:t>6/17/2020</a:t>
+              <a:t>6/20/2020</a:t>
             </a:fld>
             <a:endParaRPr lang="en-US"/>
           </a:p>
@@ -3228,7 +3228,7 @@
           <a:p>
             <a:fld id="{58201DAA-B5A1-427F-9C09-5A976EC72888}" type="datetimeFigureOut">
               <a:rPr lang="en-US" smtClean="0"/>
-              <a:t>6/17/2020</a:t>
+              <a:t>6/20/2020</a:t>
             </a:fld>
             <a:endParaRPr lang="en-US"/>
           </a:p>
@@ -3398,7 +3398,7 @@
           <a:p>
             <a:fld id="{58201DAA-B5A1-427F-9C09-5A976EC72888}" type="datetimeFigureOut">
               <a:rPr lang="en-US" smtClean="0"/>
-              <a:t>6/17/2020</a:t>
+              <a:t>6/20/2020</a:t>
             </a:fld>
             <a:endParaRPr lang="en-US"/>
           </a:p>
@@ -3645,7 +3645,7 @@
           <a:p>
             <a:fld id="{58201DAA-B5A1-427F-9C09-5A976EC72888}" type="datetimeFigureOut">
               <a:rPr lang="en-US" smtClean="0"/>
-              <a:t>6/17/2020</a:t>
+              <a:t>6/20/2020</a:t>
             </a:fld>
             <a:endParaRPr lang="en-US"/>
           </a:p>
@@ -3937,7 +3937,7 @@
           <a:p>
             <a:fld id="{58201DAA-B5A1-427F-9C09-5A976EC72888}" type="datetimeFigureOut">
               <a:rPr lang="en-US" smtClean="0"/>
-              <a:t>6/17/2020</a:t>
+              <a:t>6/20/2020</a:t>
             </a:fld>
             <a:endParaRPr lang="en-US"/>
           </a:p>
@@ -4381,7 +4381,7 @@
           <a:p>
             <a:fld id="{58201DAA-B5A1-427F-9C09-5A976EC72888}" type="datetimeFigureOut">
               <a:rPr lang="en-US" smtClean="0"/>
-              <a:t>6/17/2020</a:t>
+              <a:t>6/20/2020</a:t>
             </a:fld>
             <a:endParaRPr lang="en-US"/>
           </a:p>
@@ -4499,7 +4499,7 @@
           <a:p>
             <a:fld id="{58201DAA-B5A1-427F-9C09-5A976EC72888}" type="datetimeFigureOut">
               <a:rPr lang="en-US" smtClean="0"/>
-              <a:t>6/17/2020</a:t>
+              <a:t>6/20/2020</a:t>
             </a:fld>
             <a:endParaRPr lang="en-US"/>
           </a:p>
@@ -4594,7 +4594,7 @@
           <a:p>
             <a:fld id="{58201DAA-B5A1-427F-9C09-5A976EC72888}" type="datetimeFigureOut">
               <a:rPr lang="en-US" smtClean="0"/>
-              <a:t>6/17/2020</a:t>
+              <a:t>6/20/2020</a:t>
             </a:fld>
             <a:endParaRPr lang="en-US"/>
           </a:p>
@@ -4873,7 +4873,7 @@
           <a:p>
             <a:fld id="{58201DAA-B5A1-427F-9C09-5A976EC72888}" type="datetimeFigureOut">
               <a:rPr lang="en-US" smtClean="0"/>
-              <a:t>6/17/2020</a:t>
+              <a:t>6/20/2020</a:t>
             </a:fld>
             <a:endParaRPr lang="en-US"/>
           </a:p>
@@ -5148,7 +5148,7 @@
           <a:p>
             <a:fld id="{58201DAA-B5A1-427F-9C09-5A976EC72888}" type="datetimeFigureOut">
               <a:rPr lang="en-US" smtClean="0"/>
-              <a:t>6/17/2020</a:t>
+              <a:t>6/20/2020</a:t>
             </a:fld>
             <a:endParaRPr lang="en-US"/>
           </a:p>
@@ -5577,7 +5577,7 @@
           <a:p>
             <a:fld id="{58201DAA-B5A1-427F-9C09-5A976EC72888}" type="datetimeFigureOut">
               <a:rPr lang="en-US" smtClean="0"/>
-              <a:t>6/17/2020</a:t>
+              <a:t>6/20/2020</a:t>
             </a:fld>
             <a:endParaRPr lang="en-US"/>
           </a:p>
@@ -6455,12 +6455,8 @@
           </a:p>
           <a:p>
             <a:r>
-              <a:rPr lang="en-US" dirty="0" err="1"/>
-              <a:t>Natrual</a:t>
-            </a:r>
-            <a:r>
               <a:rPr lang="en-US" dirty="0"/>
-              <a:t> Gas (electricity and industry)</a:t>
+              <a:t>Natural Gas (electricity and industry)</a:t>
             </a:r>
           </a:p>
           <a:p>
@@ -6469,7 +6465,7 @@
           <a:p>
             <a:r>
               <a:rPr lang="en-US" dirty="0"/>
-              <a:t>Cement (infrastructure)</a:t>
+              <a:t>Cement Production (infrastructure)</a:t>
             </a:r>
           </a:p>
           <a:p>
@@ -6566,8 +6562,8 @@
         </p:nvSpPr>
         <p:spPr>
           <a:xfrm>
-            <a:off x="1622729" y="1455938"/>
-            <a:ext cx="8946541" cy="5402062"/>
+            <a:off x="1508429" y="2238375"/>
+            <a:ext cx="8946541" cy="3829050"/>
           </a:xfrm>
         </p:spPr>
         <p:txBody>
@@ -6578,17 +6574,8 @@
           <a:p>
             <a:r>
               <a:rPr lang="en-US" dirty="0"/>
-              <a:t>When carbon emissions rapidly increased, earths climate began to change at a faster rate. </a:t>
-            </a:r>
-          </a:p>
-          <a:p>
-            <a:r>
-              <a:rPr lang="en-US" dirty="0"/>
-              <a:t>This rapid increase in carbon emissions is largely due to the demands created from an increasing global population. (The Great Acceleration)</a:t>
-            </a:r>
-          </a:p>
-          <a:p>
-            <a:endParaRPr lang="en-US" dirty="0"/>
+              <a:t>When carbon emissions rapidly increased, earths climate began to change at a faster rate</a:t>
+            </a:r>
           </a:p>
           <a:p>
             <a:pPr marL="0" indent="0">
@@ -6599,55 +6586,16 @@
           <a:p>
             <a:r>
               <a:rPr lang="en-US" dirty="0"/>
-              <a:t>Top five sources of carbon emissions:</a:t>
-            </a:r>
+              <a:t>This rapid increase in carbon emissions is largely due to the demands created from an increasing global population, this period in history is referred to as The Great Acceleration</a:t>
+            </a:r>
+          </a:p>
+          <a:p>
+            <a:endParaRPr lang="en-US" dirty="0"/>
           </a:p>
           <a:p>
             <a:pPr marL="0" indent="0">
               <a:buNone/>
             </a:pPr>
-            <a:r>
-              <a:rPr lang="en-US" dirty="0"/>
-              <a:t>	Coal (electricity and steel production)</a:t>
-            </a:r>
-          </a:p>
-          <a:p>
-            <a:pPr marL="0" indent="0">
-              <a:buNone/>
-            </a:pPr>
-            <a:r>
-              <a:rPr lang="en-US" dirty="0"/>
-              <a:t>	Oil (transportation)</a:t>
-            </a:r>
-          </a:p>
-          <a:p>
-            <a:pPr marL="0" indent="0">
-              <a:buNone/>
-            </a:pPr>
-            <a:r>
-              <a:rPr lang="en-US" dirty="0"/>
-              <a:t>	Gas (electricity and industry)</a:t>
-            </a:r>
-          </a:p>
-          <a:p>
-            <a:pPr marL="0" indent="0">
-              <a:buNone/>
-            </a:pPr>
-            <a:r>
-              <a:rPr lang="en-US" dirty="0"/>
-              <a:t>	Cement (infrastructure)</a:t>
-            </a:r>
-          </a:p>
-          <a:p>
-            <a:pPr marL="0" indent="0">
-              <a:buNone/>
-            </a:pPr>
-            <a:r>
-              <a:rPr lang="en-US" dirty="0"/>
-              <a:t>	Flaring (crude oil extraction)</a:t>
-            </a:r>
-          </a:p>
-          <a:p>
             <a:endParaRPr lang="en-US" dirty="0"/>
           </a:p>
           <a:p>
@@ -6727,7 +6675,7 @@
             <a:spLocks noGrp="1"/>
           </p:cNvSpPr>
           <p:nvPr>
-            <p:ph idx="1"/>
+            <p:ph sz="half" idx="1"/>
           </p:nvPr>
         </p:nvSpPr>
         <p:spPr/>
@@ -6744,7 +6692,7 @@
               </a:buClr>
             </a:pPr>
             <a:r>
-              <a:rPr lang="en-US" sz="1700" dirty="0">
+              <a:rPr lang="en-US" sz="2000" dirty="0">
                 <a:solidFill>
                   <a:prstClr val="white"/>
                 </a:solidFill>
@@ -6763,7 +6711,7 @@
               <a:buNone/>
             </a:pPr>
             <a:r>
-              <a:rPr lang="en-US" sz="1700" dirty="0">
+              <a:rPr lang="en-US" sz="2000" dirty="0">
                 <a:solidFill>
                   <a:prstClr val="white"/>
                 </a:solidFill>
@@ -6782,7 +6730,7 @@
               <a:buNone/>
             </a:pPr>
             <a:r>
-              <a:rPr lang="en-US" sz="1700" dirty="0">
+              <a:rPr lang="en-US" sz="2000" dirty="0">
                 <a:solidFill>
                   <a:prstClr val="white"/>
                 </a:solidFill>
@@ -6801,7 +6749,7 @@
               <a:buNone/>
             </a:pPr>
             <a:r>
-              <a:rPr lang="en-US" sz="1700" dirty="0">
+              <a:rPr lang="en-US" sz="2000" dirty="0">
                 <a:solidFill>
                   <a:prstClr val="white"/>
                 </a:solidFill>
@@ -6820,7 +6768,7 @@
               <a:buNone/>
             </a:pPr>
             <a:r>
-              <a:rPr lang="en-US" sz="1700" dirty="0">
+              <a:rPr lang="en-US" sz="2000" dirty="0">
                 <a:solidFill>
                   <a:prstClr val="white"/>
                 </a:solidFill>
@@ -6839,13 +6787,171 @@
               <a:buNone/>
             </a:pPr>
             <a:r>
-              <a:rPr lang="en-US" sz="1700" dirty="0">
+              <a:rPr lang="en-US" sz="2000" dirty="0">
                 <a:solidFill>
                   <a:prstClr val="white"/>
                 </a:solidFill>
               </a:rPr>
               <a:t>	Japan</a:t>
             </a:r>
+          </a:p>
+          <a:p>
+            <a:endParaRPr lang="en-US" dirty="0"/>
+          </a:p>
+        </p:txBody>
+      </p:sp>
+      <p:sp>
+        <p:nvSpPr>
+          <p:cNvPr id="4" name="Content Placeholder 3">
+            <a:extLst>
+              <a:ext uri="{FF2B5EF4-FFF2-40B4-BE49-F238E27FC236}">
+                <a16:creationId xmlns:a16="http://schemas.microsoft.com/office/drawing/2014/main" id="{540F0FB4-CA32-426E-8110-4BF824DC24CD}"/>
+              </a:ext>
+            </a:extLst>
+          </p:cNvPr>
+          <p:cNvSpPr>
+            <a:spLocks noGrp="1"/>
+          </p:cNvSpPr>
+          <p:nvPr>
+            <p:ph sz="half" idx="2"/>
+          </p:nvPr>
+        </p:nvSpPr>
+        <p:spPr>
+          <a:xfrm>
+            <a:off x="6172200" y="2056093"/>
+            <a:ext cx="5610225" cy="4200245"/>
+          </a:xfrm>
+        </p:spPr>
+        <p:txBody>
+          <a:bodyPr/>
+          <a:lstStyle/>
+          <a:p>
+            <a:pPr lvl="0">
+              <a:buClr>
+                <a:srgbClr val="1E5155">
+                  <a:lumMod val="40000"/>
+                  <a:lumOff val="60000"/>
+                </a:srgbClr>
+              </a:buClr>
+            </a:pPr>
+            <a:r>
+              <a:rPr lang="en-US" sz="2000" dirty="0">
+                <a:solidFill>
+                  <a:prstClr val="white"/>
+                </a:solidFill>
+              </a:rPr>
+              <a:t>Top five sources of carbon emissions:</a:t>
+            </a:r>
+          </a:p>
+          <a:p>
+            <a:pPr marL="0" lvl="0" indent="0">
+              <a:buClr>
+                <a:srgbClr val="1E5155">
+                  <a:lumMod val="40000"/>
+                  <a:lumOff val="60000"/>
+                </a:srgbClr>
+              </a:buClr>
+              <a:buNone/>
+            </a:pPr>
+            <a:r>
+              <a:rPr lang="en-US" sz="2000" dirty="0">
+                <a:solidFill>
+                  <a:prstClr val="white"/>
+                </a:solidFill>
+              </a:rPr>
+              <a:t>	Coal (electricity and steel production)</a:t>
+            </a:r>
+          </a:p>
+          <a:p>
+            <a:pPr marL="0" lvl="0" indent="0">
+              <a:buClr>
+                <a:srgbClr val="1E5155">
+                  <a:lumMod val="40000"/>
+                  <a:lumOff val="60000"/>
+                </a:srgbClr>
+              </a:buClr>
+              <a:buNone/>
+            </a:pPr>
+            <a:r>
+              <a:rPr lang="en-US" sz="2000" dirty="0">
+                <a:solidFill>
+                  <a:prstClr val="white"/>
+                </a:solidFill>
+              </a:rPr>
+              <a:t>	Oil (transportation)</a:t>
+            </a:r>
+          </a:p>
+          <a:p>
+            <a:pPr marL="0" lvl="0" indent="0">
+              <a:buClr>
+                <a:srgbClr val="1E5155">
+                  <a:lumMod val="40000"/>
+                  <a:lumOff val="60000"/>
+                </a:srgbClr>
+              </a:buClr>
+              <a:buNone/>
+            </a:pPr>
+            <a:r>
+              <a:rPr lang="en-US" sz="2000" dirty="0">
+                <a:solidFill>
+                  <a:prstClr val="white"/>
+                </a:solidFill>
+              </a:rPr>
+              <a:t>	Natural Gas (electricity and industry)</a:t>
+            </a:r>
+          </a:p>
+          <a:p>
+            <a:pPr marL="0" lvl="0" indent="0">
+              <a:buClr>
+                <a:srgbClr val="1E5155">
+                  <a:lumMod val="40000"/>
+                  <a:lumOff val="60000"/>
+                </a:srgbClr>
+              </a:buClr>
+              <a:buNone/>
+            </a:pPr>
+            <a:r>
+              <a:rPr lang="en-US" sz="2000" dirty="0">
+                <a:solidFill>
+                  <a:prstClr val="white"/>
+                </a:solidFill>
+              </a:rPr>
+              <a:t>	Cement Production (infrastructure)</a:t>
+            </a:r>
+          </a:p>
+          <a:p>
+            <a:pPr marL="0" lvl="0" indent="0">
+              <a:buClr>
+                <a:srgbClr val="1E5155">
+                  <a:lumMod val="40000"/>
+                  <a:lumOff val="60000"/>
+                </a:srgbClr>
+              </a:buClr>
+              <a:buNone/>
+            </a:pPr>
+            <a:r>
+              <a:rPr lang="en-US" sz="2000" dirty="0">
+                <a:solidFill>
+                  <a:prstClr val="white"/>
+                </a:solidFill>
+              </a:rPr>
+              <a:t>	Flaring (crude oil extraction)</a:t>
+            </a:r>
+          </a:p>
+          <a:p>
+            <a:pPr lvl="0">
+              <a:buClr>
+                <a:srgbClr val="1E5155">
+                  <a:lumMod val="40000"/>
+                  <a:lumOff val="60000"/>
+                </a:srgbClr>
+              </a:buClr>
+            </a:pPr>
+            <a:endParaRPr lang="en-US" sz="2000" dirty="0">
+              <a:solidFill>
+                <a:prstClr val="white"/>
+              </a:solidFill>
+            </a:endParaRPr>
           </a:p>
           <a:p>
             <a:endParaRPr lang="en-US" dirty="0"/>
@@ -6991,7 +7097,12 @@
             <p:ph idx="1"/>
           </p:nvPr>
         </p:nvSpPr>
-        <p:spPr/>
+        <p:spPr>
+          <a:xfrm>
+            <a:off x="1104293" y="2479046"/>
+            <a:ext cx="8946541" cy="4195481"/>
+          </a:xfrm>
+        </p:spPr>
         <p:txBody>
           <a:bodyPr/>
           <a:lstStyle/>
@@ -7022,11 +7133,8 @@
           <a:p>
             <a:r>
               <a:rPr lang="en-US" dirty="0"/>
-              <a:t>What industries are producing the most carbon emissions?</a:t>
-            </a:r>
-          </a:p>
-          <a:p>
-            <a:endParaRPr lang="en-US" dirty="0"/>
+              <a:t>What are the main sources of carbon emissions? </a:t>
+            </a:r>
           </a:p>
         </p:txBody>
       </p:sp>
@@ -7044,6 +7152,144 @@
 </file>
 
 <file path=ppt/slides/slide3.xml><?xml version="1.0" encoding="utf-8"?>
+<p:sld xmlns:a="http://schemas.openxmlformats.org/drawingml/2006/main" xmlns:r="http://schemas.openxmlformats.org/officeDocument/2006/relationships" xmlns:p="http://schemas.openxmlformats.org/presentationml/2006/main">
+  <p:cSld>
+    <p:spTree>
+      <p:nvGrpSpPr>
+        <p:cNvPr id="1" name=""/>
+        <p:cNvGrpSpPr/>
+        <p:nvPr/>
+      </p:nvGrpSpPr>
+      <p:grpSpPr>
+        <a:xfrm>
+          <a:off x="0" y="0"/>
+          <a:ext cx="0" cy="0"/>
+          <a:chOff x="0" y="0"/>
+          <a:chExt cx="0" cy="0"/>
+        </a:xfrm>
+      </p:grpSpPr>
+      <p:sp>
+        <p:nvSpPr>
+          <p:cNvPr id="2" name="Title 1">
+            <a:extLst>
+              <a:ext uri="{FF2B5EF4-FFF2-40B4-BE49-F238E27FC236}">
+                <a16:creationId xmlns:a16="http://schemas.microsoft.com/office/drawing/2014/main" id="{FBB0AFDD-A8A5-47CB-B3A1-8ABC7F132E7B}"/>
+              </a:ext>
+            </a:extLst>
+          </p:cNvPr>
+          <p:cNvSpPr>
+            <a:spLocks noGrp="1"/>
+          </p:cNvSpPr>
+          <p:nvPr>
+            <p:ph type="title"/>
+          </p:nvPr>
+        </p:nvSpPr>
+        <p:spPr/>
+        <p:txBody>
+          <a:bodyPr/>
+          <a:lstStyle/>
+          <a:p>
+            <a:pPr algn="ctr"/>
+            <a:r>
+              <a:rPr lang="en-US" dirty="0"/>
+              <a:t>Data Used</a:t>
+            </a:r>
+          </a:p>
+        </p:txBody>
+      </p:sp>
+      <p:sp>
+        <p:nvSpPr>
+          <p:cNvPr id="3" name="Content Placeholder 2">
+            <a:extLst>
+              <a:ext uri="{FF2B5EF4-FFF2-40B4-BE49-F238E27FC236}">
+                <a16:creationId xmlns:a16="http://schemas.microsoft.com/office/drawing/2014/main" id="{6D6E8DEC-C61F-431E-88E8-E5C203D4D198}"/>
+              </a:ext>
+            </a:extLst>
+          </p:cNvPr>
+          <p:cNvSpPr>
+            <a:spLocks noGrp="1"/>
+          </p:cNvSpPr>
+          <p:nvPr>
+            <p:ph idx="1"/>
+          </p:nvPr>
+        </p:nvSpPr>
+        <p:spPr/>
+        <p:txBody>
+          <a:bodyPr/>
+          <a:lstStyle/>
+          <a:p>
+            <a:r>
+              <a:rPr lang="en-US" dirty="0"/>
+              <a:t>Carbon emissions data: </a:t>
+            </a:r>
+          </a:p>
+          <a:p>
+            <a:pPr marL="0" indent="0">
+              <a:buNone/>
+            </a:pPr>
+            <a:r>
+              <a:rPr lang="en-US" dirty="0"/>
+              <a:t>	CDIAC (Carbon Dioxide Information Analysis Center)</a:t>
+            </a:r>
+          </a:p>
+          <a:p>
+            <a:endParaRPr lang="en-US" dirty="0"/>
+          </a:p>
+          <a:p>
+            <a:r>
+              <a:rPr lang="en-US" dirty="0"/>
+              <a:t>Temperature data:</a:t>
+            </a:r>
+          </a:p>
+          <a:p>
+            <a:pPr marL="0" indent="0">
+              <a:buNone/>
+            </a:pPr>
+            <a:r>
+              <a:rPr lang="en-US" dirty="0"/>
+              <a:t>	GISTEMP (GISS Surface Temperature Analysis)</a:t>
+            </a:r>
+          </a:p>
+          <a:p>
+            <a:endParaRPr lang="en-US" dirty="0"/>
+          </a:p>
+          <a:p>
+            <a:r>
+              <a:rPr lang="en-US" dirty="0"/>
+              <a:t>Natural disaster data:</a:t>
+            </a:r>
+          </a:p>
+          <a:p>
+            <a:pPr marL="457200" lvl="1" indent="0">
+              <a:buNone/>
+            </a:pPr>
+            <a:r>
+              <a:rPr lang="en-US" dirty="0"/>
+              <a:t>OFDA (Office of Foreign Disaster Assistance)</a:t>
+            </a:r>
+          </a:p>
+          <a:p>
+            <a:pPr marL="457200" lvl="1" indent="0">
+              <a:buNone/>
+            </a:pPr>
+            <a:endParaRPr lang="en-US" dirty="0"/>
+          </a:p>
+        </p:txBody>
+      </p:sp>
+    </p:spTree>
+    <p:extLst>
+      <p:ext uri="{BB962C8B-B14F-4D97-AF65-F5344CB8AC3E}">
+        <p14:creationId xmlns:p14="http://schemas.microsoft.com/office/powerpoint/2010/main" val="4193923093"/>
+      </p:ext>
+    </p:extLst>
+  </p:cSld>
+  <p:clrMapOvr>
+    <a:masterClrMapping/>
+  </p:clrMapOvr>
+</p:sld>
+</file>
+
+<file path=ppt/slides/slide4.xml><?xml version="1.0" encoding="utf-8"?>
 <p:sld xmlns:a="http://schemas.openxmlformats.org/drawingml/2006/main" xmlns:r="http://schemas.openxmlformats.org/officeDocument/2006/relationships" xmlns:p="http://schemas.openxmlformats.org/presentationml/2006/main">
   <p:cSld>
     <p:bg>
@@ -7175,136 +7421,6 @@
 </p:sld>
 </file>
 
-<file path=ppt/slides/slide4.xml><?xml version="1.0" encoding="utf-8"?>
-<p:sld xmlns:a="http://schemas.openxmlformats.org/drawingml/2006/main" xmlns:r="http://schemas.openxmlformats.org/officeDocument/2006/relationships" xmlns:p="http://schemas.openxmlformats.org/presentationml/2006/main">
-  <p:cSld>
-    <p:spTree>
-      <p:nvGrpSpPr>
-        <p:cNvPr id="1" name=""/>
-        <p:cNvGrpSpPr/>
-        <p:nvPr/>
-      </p:nvGrpSpPr>
-      <p:grpSpPr>
-        <a:xfrm>
-          <a:off x="0" y="0"/>
-          <a:ext cx="0" cy="0"/>
-          <a:chOff x="0" y="0"/>
-          <a:chExt cx="0" cy="0"/>
-        </a:xfrm>
-      </p:grpSpPr>
-      <p:sp>
-        <p:nvSpPr>
-          <p:cNvPr id="2" name="Title 1">
-            <a:extLst>
-              <a:ext uri="{FF2B5EF4-FFF2-40B4-BE49-F238E27FC236}">
-                <a16:creationId xmlns:a16="http://schemas.microsoft.com/office/drawing/2014/main" id="{743C3AD9-3D76-4F4B-ABF8-6836C1EA85E6}"/>
-              </a:ext>
-            </a:extLst>
-          </p:cNvPr>
-          <p:cNvSpPr>
-            <a:spLocks noGrp="1"/>
-          </p:cNvSpPr>
-          <p:nvPr>
-            <p:ph type="title"/>
-          </p:nvPr>
-        </p:nvSpPr>
-        <p:spPr/>
-        <p:txBody>
-          <a:bodyPr/>
-          <a:lstStyle/>
-          <a:p>
-            <a:pPr algn="ctr"/>
-            <a:r>
-              <a:rPr lang="en-US" dirty="0"/>
-              <a:t>The Great Acceleration</a:t>
-            </a:r>
-          </a:p>
-        </p:txBody>
-      </p:sp>
-      <p:sp>
-        <p:nvSpPr>
-          <p:cNvPr id="3" name="Content Placeholder 2">
-            <a:extLst>
-              <a:ext uri="{FF2B5EF4-FFF2-40B4-BE49-F238E27FC236}">
-                <a16:creationId xmlns:a16="http://schemas.microsoft.com/office/drawing/2014/main" id="{AF44368A-7703-41BD-9D6A-AF1A52F5E29F}"/>
-              </a:ext>
-            </a:extLst>
-          </p:cNvPr>
-          <p:cNvSpPr>
-            <a:spLocks noGrp="1"/>
-          </p:cNvSpPr>
-          <p:nvPr>
-            <p:ph idx="1"/>
-          </p:nvPr>
-        </p:nvSpPr>
-        <p:spPr>
-          <a:xfrm>
-            <a:off x="1422908" y="2567823"/>
-            <a:ext cx="8946541" cy="4195481"/>
-          </a:xfrm>
-        </p:spPr>
-        <p:txBody>
-          <a:bodyPr/>
-          <a:lstStyle/>
-          <a:p>
-            <a:r>
-              <a:rPr lang="en-US" dirty="0"/>
-              <a:t>Mid 20</a:t>
-            </a:r>
-            <a:r>
-              <a:rPr lang="en-US" baseline="30000" dirty="0"/>
-              <a:t>th</a:t>
-            </a:r>
-            <a:r>
-              <a:rPr lang="en-US" dirty="0"/>
-              <a:t> century</a:t>
-            </a:r>
-          </a:p>
-          <a:p>
-            <a:endParaRPr lang="en-US" dirty="0"/>
-          </a:p>
-          <a:p>
-            <a:r>
-              <a:rPr lang="en-US" dirty="0"/>
-              <a:t>Majority of countries on the planet</a:t>
-            </a:r>
-          </a:p>
-          <a:p>
-            <a:endParaRPr lang="en-US" dirty="0"/>
-          </a:p>
-          <a:p>
-            <a:r>
-              <a:rPr lang="en-US" dirty="0"/>
-              <a:t>Exponentially increased its growth rate of progress</a:t>
-            </a:r>
-          </a:p>
-          <a:p>
-            <a:endParaRPr lang="en-US" dirty="0"/>
-          </a:p>
-          <a:p>
-            <a:r>
-              <a:rPr lang="en-US" dirty="0"/>
-              <a:t>Increase of burning fossil fuels (coal, oil, natural gases, etc.), concrete Manufacturing, and Flaring</a:t>
-            </a:r>
-          </a:p>
-          <a:p>
-            <a:endParaRPr lang="en-US" dirty="0"/>
-          </a:p>
-        </p:txBody>
-      </p:sp>
-    </p:spTree>
-    <p:extLst>
-      <p:ext uri="{BB962C8B-B14F-4D97-AF65-F5344CB8AC3E}">
-        <p14:creationId xmlns:p14="http://schemas.microsoft.com/office/powerpoint/2010/main" val="1319324491"/>
-      </p:ext>
-    </p:extLst>
-  </p:cSld>
-  <p:clrMapOvr>
-    <a:masterClrMapping/>
-  </p:clrMapOvr>
-</p:sld>
-</file>
-
 <file path=ppt/slides/slide5.xml><?xml version="1.0" encoding="utf-8"?>
 <p:sld xmlns:a="http://schemas.openxmlformats.org/drawingml/2006/main" xmlns:r="http://schemas.openxmlformats.org/officeDocument/2006/relationships" xmlns:p="http://schemas.openxmlformats.org/presentationml/2006/main">
   <p:cSld>
@@ -7327,7 +7443,7 @@
           <p:cNvPr id="2" name="Title 1">
             <a:extLst>
               <a:ext uri="{FF2B5EF4-FFF2-40B4-BE49-F238E27FC236}">
-                <a16:creationId xmlns:a16="http://schemas.microsoft.com/office/drawing/2014/main" id="{E4FE674F-9682-4DB2-B086-A6664A322AB7}"/>
+                <a16:creationId xmlns:a16="http://schemas.microsoft.com/office/drawing/2014/main" id="{743C3AD9-3D76-4F4B-ABF8-6836C1EA85E6}"/>
               </a:ext>
             </a:extLst>
           </p:cNvPr>
@@ -7338,12 +7454,7 @@
             <p:ph type="title"/>
           </p:nvPr>
         </p:nvSpPr>
-        <p:spPr>
-          <a:xfrm>
-            <a:off x="777502" y="252693"/>
-            <a:ext cx="9404723" cy="1400530"/>
-          </a:xfrm>
-        </p:spPr>
+        <p:spPr/>
         <p:txBody>
           <a:bodyPr/>
           <a:lstStyle/>
@@ -7351,50 +7462,86 @@
             <a:pPr algn="ctr"/>
             <a:r>
               <a:rPr lang="en-US" dirty="0"/>
-              <a:t>Global Averages (1880-2019)</a:t>
-            </a:r>
-          </a:p>
-        </p:txBody>
-      </p:sp>
-      <p:pic>
-        <p:nvPicPr>
-          <p:cNvPr id="5" name="Content Placeholder 4" descr="A close up of a map&#10;&#10;Description automatically generated">
+              <a:t>The Great Acceleration</a:t>
+            </a:r>
+          </a:p>
+        </p:txBody>
+      </p:sp>
+      <p:sp>
+        <p:nvSpPr>
+          <p:cNvPr id="3" name="Content Placeholder 2">
             <a:extLst>
               <a:ext uri="{FF2B5EF4-FFF2-40B4-BE49-F238E27FC236}">
-                <a16:creationId xmlns:a16="http://schemas.microsoft.com/office/drawing/2014/main" id="{5E25C365-6524-4688-A2A6-77C087C99131}"/>
+                <a16:creationId xmlns:a16="http://schemas.microsoft.com/office/drawing/2014/main" id="{AF44368A-7703-41BD-9D6A-AF1A52F5E29F}"/>
               </a:ext>
             </a:extLst>
           </p:cNvPr>
-          <p:cNvPicPr>
-            <a:picLocks noGrp="1" noChangeAspect="1"/>
-          </p:cNvPicPr>
+          <p:cNvSpPr>
+            <a:spLocks noGrp="1"/>
+          </p:cNvSpPr>
           <p:nvPr>
             <p:ph idx="1"/>
           </p:nvPr>
-        </p:nvPicPr>
-        <p:blipFill>
-          <a:blip r:embed="rId2">
-            <a:extLst>
-              <a:ext uri="{28A0092B-C50C-407E-A947-70E740481C1C}">
-                <a14:useLocalDpi xmlns:a14="http://schemas.microsoft.com/office/drawing/2010/main" val="0"/>
-              </a:ext>
-            </a:extLst>
-          </a:blip>
-          <a:stretch>
-            <a:fillRect/>
-          </a:stretch>
-        </p:blipFill>
+        </p:nvSpPr>
         <p:spPr>
           <a:xfrm>
-            <a:off x="1622425" y="1800225"/>
-            <a:ext cx="8947150" cy="4805082"/>
+            <a:off x="1422908" y="2567823"/>
+            <a:ext cx="8946541" cy="4195481"/>
           </a:xfrm>
         </p:spPr>
-      </p:pic>
+        <p:txBody>
+          <a:bodyPr/>
+          <a:lstStyle/>
+          <a:p>
+            <a:r>
+              <a:rPr lang="en-US" dirty="0"/>
+              <a:t>Mid 20</a:t>
+            </a:r>
+            <a:r>
+              <a:rPr lang="en-US" baseline="30000" dirty="0"/>
+              <a:t>th</a:t>
+            </a:r>
+            <a:r>
+              <a:rPr lang="en-US" dirty="0"/>
+              <a:t> century</a:t>
+            </a:r>
+          </a:p>
+          <a:p>
+            <a:endParaRPr lang="en-US" dirty="0"/>
+          </a:p>
+          <a:p>
+            <a:r>
+              <a:rPr lang="en-US" dirty="0"/>
+              <a:t>Majority of countries on the planet</a:t>
+            </a:r>
+          </a:p>
+          <a:p>
+            <a:endParaRPr lang="en-US" dirty="0"/>
+          </a:p>
+          <a:p>
+            <a:r>
+              <a:rPr lang="en-US" dirty="0"/>
+              <a:t>Exponentially increased its growth rate of progress</a:t>
+            </a:r>
+          </a:p>
+          <a:p>
+            <a:endParaRPr lang="en-US" dirty="0"/>
+          </a:p>
+          <a:p>
+            <a:r>
+              <a:rPr lang="en-US" dirty="0"/>
+              <a:t>Increase of burning fossil fuels (coal, oil, natural gases, etc.), concrete Manufacturing, and Flaring</a:t>
+            </a:r>
+          </a:p>
+          <a:p>
+            <a:endParaRPr lang="en-US" dirty="0"/>
+          </a:p>
+        </p:txBody>
+      </p:sp>
     </p:spTree>
     <p:extLst>
       <p:ext uri="{BB962C8B-B14F-4D97-AF65-F5344CB8AC3E}">
-        <p14:creationId xmlns:p14="http://schemas.microsoft.com/office/powerpoint/2010/main" val="2450038632"/>
+        <p14:creationId xmlns:p14="http://schemas.microsoft.com/office/powerpoint/2010/main" val="1319324491"/>
       </p:ext>
     </p:extLst>
   </p:cSld>
@@ -7426,7 +7573,7 @@
           <p:cNvPr id="2" name="Title 1">
             <a:extLst>
               <a:ext uri="{FF2B5EF4-FFF2-40B4-BE49-F238E27FC236}">
-                <a16:creationId xmlns:a16="http://schemas.microsoft.com/office/drawing/2014/main" id="{9C5B9B2E-08A4-4475-8128-DFF3D2C8F77B}"/>
+                <a16:creationId xmlns:a16="http://schemas.microsoft.com/office/drawing/2014/main" id="{E4FE674F-9682-4DB2-B086-A6664A322AB7}"/>
               </a:ext>
             </a:extLst>
           </p:cNvPr>
@@ -7439,7 +7586,7 @@
         </p:nvSpPr>
         <p:spPr>
           <a:xfrm>
-            <a:off x="1393638" y="290793"/>
+            <a:off x="1164852" y="252693"/>
             <a:ext cx="9404723" cy="1400530"/>
           </a:xfrm>
         </p:spPr>
@@ -7450,17 +7597,17 @@
             <a:pPr algn="ctr"/>
             <a:r>
               <a:rPr lang="en-US" dirty="0"/>
-              <a:t>Before and After 1950</a:t>
+              <a:t>Global Temperature Averages (1880-2019)</a:t>
             </a:r>
           </a:p>
         </p:txBody>
       </p:sp>
       <p:pic>
         <p:nvPicPr>
-          <p:cNvPr id="5" name="Content Placeholder 4" descr="A close up of a map&#10;&#10;Description automatically generated">
+          <p:cNvPr id="6" name="Content Placeholder 5" descr="A close up of a map&#10;&#10;Description automatically generated">
             <a:extLst>
               <a:ext uri="{FF2B5EF4-FFF2-40B4-BE49-F238E27FC236}">
-                <a16:creationId xmlns:a16="http://schemas.microsoft.com/office/drawing/2014/main" id="{3A0E35A8-F54C-40B1-B209-6F6C85A86B80}"/>
+                <a16:creationId xmlns:a16="http://schemas.microsoft.com/office/drawing/2014/main" id="{C4D2EB6B-359C-4FF4-81E5-09D3BC850288}"/>
               </a:ext>
             </a:extLst>
           </p:cNvPr>
@@ -7468,7 +7615,7 @@
             <a:picLocks noGrp="1" noChangeAspect="1"/>
           </p:cNvPicPr>
           <p:nvPr>
-            <p:ph sz="half" idx="1"/>
+            <p:ph idx="1"/>
           </p:nvPr>
         </p:nvPicPr>
         <p:blipFill>
@@ -7485,50 +7632,15 @@
         </p:blipFill>
         <p:spPr>
           <a:xfrm>
-            <a:off x="504825" y="2152650"/>
-            <a:ext cx="5480051" cy="4314825"/>
-          </a:xfrm>
-        </p:spPr>
-      </p:pic>
-      <p:pic>
-        <p:nvPicPr>
-          <p:cNvPr id="8" name="Content Placeholder 7" descr="A close up of a map&#10;&#10;Description automatically generated">
-            <a:extLst>
-              <a:ext uri="{FF2B5EF4-FFF2-40B4-BE49-F238E27FC236}">
-                <a16:creationId xmlns:a16="http://schemas.microsoft.com/office/drawing/2014/main" id="{AF51219A-A363-4DFB-89D1-98A0ECC79164}"/>
-              </a:ext>
-            </a:extLst>
-          </p:cNvPr>
-          <p:cNvPicPr>
-            <a:picLocks noGrp="1" noChangeAspect="1"/>
-          </p:cNvPicPr>
-          <p:nvPr>
-            <p:ph sz="half" idx="2"/>
-          </p:nvPr>
-        </p:nvPicPr>
-        <p:blipFill>
-          <a:blip r:embed="rId3">
-            <a:extLst>
-              <a:ext uri="{28A0092B-C50C-407E-A947-70E740481C1C}">
-                <a14:useLocalDpi xmlns:a14="http://schemas.microsoft.com/office/drawing/2010/main" val="0"/>
-              </a:ext>
-            </a:extLst>
-          </a:blip>
-          <a:stretch>
-            <a:fillRect/>
-          </a:stretch>
-        </p:blipFill>
-        <p:spPr>
-          <a:xfrm>
-            <a:off x="6207125" y="2152650"/>
-            <a:ext cx="5480050" cy="4314825"/>
+            <a:off x="1622425" y="1885950"/>
+            <a:ext cx="8947150" cy="4505325"/>
           </a:xfrm>
         </p:spPr>
       </p:pic>
     </p:spTree>
     <p:extLst>
       <p:ext uri="{BB962C8B-B14F-4D97-AF65-F5344CB8AC3E}">
-        <p14:creationId xmlns:p14="http://schemas.microsoft.com/office/powerpoint/2010/main" val="3456794288"/>
+        <p14:creationId xmlns:p14="http://schemas.microsoft.com/office/powerpoint/2010/main" val="2450038632"/>
       </p:ext>
     </p:extLst>
   </p:cSld>
@@ -7560,7 +7672,7 @@
           <p:cNvPr id="2" name="Title 1">
             <a:extLst>
               <a:ext uri="{FF2B5EF4-FFF2-40B4-BE49-F238E27FC236}">
-                <a16:creationId xmlns:a16="http://schemas.microsoft.com/office/drawing/2014/main" id="{6655B1F3-8B8C-4D22-BBF0-FF6A95C18956}"/>
+                <a16:creationId xmlns:a16="http://schemas.microsoft.com/office/drawing/2014/main" id="{9C5B9B2E-08A4-4475-8128-DFF3D2C8F77B}"/>
               </a:ext>
             </a:extLst>
           </p:cNvPr>
@@ -7573,7 +7685,7 @@
         </p:nvSpPr>
         <p:spPr>
           <a:xfrm>
-            <a:off x="1178771" y="239654"/>
+            <a:off x="1393638" y="290793"/>
             <a:ext cx="9404723" cy="1400530"/>
           </a:xfrm>
         </p:spPr>
@@ -7581,98 +7693,88 @@
           <a:bodyPr/>
           <a:lstStyle/>
           <a:p>
+            <a:pPr algn="ctr"/>
             <a:r>
               <a:rPr lang="en-US" dirty="0"/>
-              <a:t>Break down of natural disasters</a:t>
-            </a:r>
-          </a:p>
-        </p:txBody>
-      </p:sp>
-      <p:sp>
-        <p:nvSpPr>
-          <p:cNvPr id="3" name="Content Placeholder 2">
+              <a:t>Before and After 1950</a:t>
+            </a:r>
+          </a:p>
+        </p:txBody>
+      </p:sp>
+      <p:pic>
+        <p:nvPicPr>
+          <p:cNvPr id="6" name="Content Placeholder 5" descr="A close up of text on a white background&#10;&#10;Description automatically generated">
             <a:extLst>
               <a:ext uri="{FF2B5EF4-FFF2-40B4-BE49-F238E27FC236}">
-                <a16:creationId xmlns:a16="http://schemas.microsoft.com/office/drawing/2014/main" id="{90078890-A4DB-4FC6-B8D6-F9EBF4F64FE0}"/>
+                <a16:creationId xmlns:a16="http://schemas.microsoft.com/office/drawing/2014/main" id="{2A623920-7EBD-4BDF-BF9B-30313364427A}"/>
               </a:ext>
             </a:extLst>
           </p:cNvPr>
-          <p:cNvSpPr>
-            <a:spLocks noGrp="1"/>
-          </p:cNvSpPr>
-          <p:nvPr>
-            <p:ph idx="1"/>
-          </p:nvPr>
-        </p:nvSpPr>
-        <p:spPr/>
-        <p:txBody>
-          <a:bodyPr>
-            <a:normAutofit/>
-          </a:bodyPr>
-          <a:lstStyle/>
-          <a:p>
-            <a:r>
-              <a:rPr lang="en-US" dirty="0"/>
-              <a:t>Earthquakes</a:t>
-            </a:r>
-          </a:p>
-          <a:p>
-            <a:r>
-              <a:rPr lang="en-US" dirty="0"/>
-              <a:t>Volcanoes</a:t>
-            </a:r>
-          </a:p>
-          <a:p>
-            <a:r>
-              <a:rPr lang="en-US" dirty="0"/>
-              <a:t>Landslides</a:t>
-            </a:r>
-          </a:p>
-          <a:p>
-            <a:r>
-              <a:rPr lang="en-US" dirty="0"/>
-              <a:t>Droughts</a:t>
-            </a:r>
-          </a:p>
-          <a:p>
-            <a:r>
-              <a:rPr lang="en-US" dirty="0"/>
-              <a:t>Extreme Weather (Hurricanes, Tornados, Cyclones)</a:t>
-            </a:r>
-          </a:p>
-          <a:p>
-            <a:r>
-              <a:rPr lang="en-US" dirty="0"/>
-              <a:t>Floods</a:t>
-            </a:r>
-          </a:p>
-          <a:p>
-            <a:r>
-              <a:rPr lang="en-US" dirty="0"/>
-              <a:t>Extreme temperature spikes</a:t>
-            </a:r>
-          </a:p>
-          <a:p>
-            <a:r>
-              <a:rPr lang="en-US" dirty="0"/>
-              <a:t>Wildfires</a:t>
-            </a:r>
-          </a:p>
-          <a:p>
-            <a:r>
-              <a:rPr lang="en-US" dirty="0"/>
-              <a:t>Lightning</a:t>
-            </a:r>
-          </a:p>
-          <a:p>
-            <a:endParaRPr lang="en-US" u="sng" dirty="0"/>
-          </a:p>
-        </p:txBody>
-      </p:sp>
+          <p:cNvPicPr>
+            <a:picLocks noGrp="1" noChangeAspect="1"/>
+          </p:cNvPicPr>
+          <p:nvPr>
+            <p:ph sz="half" idx="1"/>
+          </p:nvPr>
+        </p:nvPicPr>
+        <p:blipFill>
+          <a:blip r:embed="rId2">
+            <a:extLst>
+              <a:ext uri="{28A0092B-C50C-407E-A947-70E740481C1C}">
+                <a14:useLocalDpi xmlns:a14="http://schemas.microsoft.com/office/drawing/2010/main" val="0"/>
+              </a:ext>
+            </a:extLst>
+          </a:blip>
+          <a:stretch>
+            <a:fillRect/>
+          </a:stretch>
+        </p:blipFill>
+        <p:spPr>
+          <a:xfrm>
+            <a:off x="504825" y="2152650"/>
+            <a:ext cx="5372100" cy="4314825"/>
+          </a:xfrm>
+        </p:spPr>
+      </p:pic>
+      <p:pic>
+        <p:nvPicPr>
+          <p:cNvPr id="13" name="Content Placeholder 12" descr="A close up of a map&#10;&#10;Description automatically generated">
+            <a:extLst>
+              <a:ext uri="{FF2B5EF4-FFF2-40B4-BE49-F238E27FC236}">
+                <a16:creationId xmlns:a16="http://schemas.microsoft.com/office/drawing/2014/main" id="{F870E62E-9CF4-4AF2-8595-A8FF5EB454D3}"/>
+              </a:ext>
+            </a:extLst>
+          </p:cNvPr>
+          <p:cNvPicPr>
+            <a:picLocks noGrp="1" noChangeAspect="1"/>
+          </p:cNvPicPr>
+          <p:nvPr>
+            <p:ph sz="half" idx="2"/>
+          </p:nvPr>
+        </p:nvPicPr>
+        <p:blipFill>
+          <a:blip r:embed="rId3">
+            <a:extLst>
+              <a:ext uri="{28A0092B-C50C-407E-A947-70E740481C1C}">
+                <a14:useLocalDpi xmlns:a14="http://schemas.microsoft.com/office/drawing/2010/main" val="0"/>
+              </a:ext>
+            </a:extLst>
+          </a:blip>
+          <a:stretch>
+            <a:fillRect/>
+          </a:stretch>
+        </p:blipFill>
+        <p:spPr>
+          <a:xfrm>
+            <a:off x="6315075" y="2152650"/>
+            <a:ext cx="5372099" cy="4314825"/>
+          </a:xfrm>
+        </p:spPr>
+      </p:pic>
     </p:spTree>
     <p:extLst>
       <p:ext uri="{BB962C8B-B14F-4D97-AF65-F5344CB8AC3E}">
-        <p14:creationId xmlns:p14="http://schemas.microsoft.com/office/powerpoint/2010/main" val="56432343"/>
+        <p14:creationId xmlns:p14="http://schemas.microsoft.com/office/powerpoint/2010/main" val="3456794288"/>
       </p:ext>
     </p:extLst>
   </p:cSld>
@@ -7704,7 +7806,7 @@
           <p:cNvPr id="2" name="Title 1">
             <a:extLst>
               <a:ext uri="{FF2B5EF4-FFF2-40B4-BE49-F238E27FC236}">
-                <a16:creationId xmlns:a16="http://schemas.microsoft.com/office/drawing/2014/main" id="{10EC273B-EA40-47EB-B6B9-190C5F1A3D07}"/>
+                <a16:creationId xmlns:a16="http://schemas.microsoft.com/office/drawing/2014/main" id="{6655B1F3-8B8C-4D22-BBF0-FF6A95C18956}"/>
               </a:ext>
             </a:extLst>
           </p:cNvPr>
@@ -7715,7 +7817,12 @@
             <p:ph type="title"/>
           </p:nvPr>
         </p:nvSpPr>
-        <p:spPr/>
+        <p:spPr>
+          <a:xfrm>
+            <a:off x="1178771" y="239654"/>
+            <a:ext cx="9404723" cy="1400530"/>
+          </a:xfrm>
+        </p:spPr>
         <p:txBody>
           <a:bodyPr/>
           <a:lstStyle/>
@@ -7728,45 +7835,88 @@
           </a:p>
         </p:txBody>
       </p:sp>
-      <p:pic>
-        <p:nvPicPr>
-          <p:cNvPr id="5" name="Content Placeholder 4" descr="A close up of a map&#10;&#10;Description automatically generated">
+      <p:sp>
+        <p:nvSpPr>
+          <p:cNvPr id="3" name="Content Placeholder 2">
             <a:extLst>
               <a:ext uri="{FF2B5EF4-FFF2-40B4-BE49-F238E27FC236}">
-                <a16:creationId xmlns:a16="http://schemas.microsoft.com/office/drawing/2014/main" id="{E3D3F5C8-2DD8-40EB-A342-118EA871A12C}"/>
+                <a16:creationId xmlns:a16="http://schemas.microsoft.com/office/drawing/2014/main" id="{90078890-A4DB-4FC6-B8D6-F9EBF4F64FE0}"/>
               </a:ext>
             </a:extLst>
           </p:cNvPr>
-          <p:cNvPicPr>
-            <a:picLocks noGrp="1" noChangeAspect="1"/>
-          </p:cNvPicPr>
+          <p:cNvSpPr>
+            <a:spLocks noGrp="1"/>
+          </p:cNvSpPr>
           <p:nvPr>
             <p:ph idx="1"/>
           </p:nvPr>
-        </p:nvPicPr>
-        <p:blipFill>
-          <a:blip r:embed="rId2">
-            <a:extLst>
-              <a:ext uri="{28A0092B-C50C-407E-A947-70E740481C1C}">
-                <a14:useLocalDpi xmlns:a14="http://schemas.microsoft.com/office/drawing/2010/main" val="0"/>
-              </a:ext>
-            </a:extLst>
-          </a:blip>
-          <a:stretch>
-            <a:fillRect/>
-          </a:stretch>
-        </p:blipFill>
-        <p:spPr>
-          <a:xfrm>
-            <a:off x="1622425" y="2041864"/>
-            <a:ext cx="8947150" cy="4283518"/>
-          </a:xfrm>
-        </p:spPr>
-      </p:pic>
+        </p:nvSpPr>
+        <p:spPr/>
+        <p:txBody>
+          <a:bodyPr>
+            <a:normAutofit/>
+          </a:bodyPr>
+          <a:lstStyle/>
+          <a:p>
+            <a:r>
+              <a:rPr lang="en-US" dirty="0"/>
+              <a:t>Extreme temperature</a:t>
+            </a:r>
+          </a:p>
+          <a:p>
+            <a:pPr marL="0" indent="0">
+              <a:buNone/>
+            </a:pPr>
+            <a:endParaRPr lang="en-US" dirty="0"/>
+          </a:p>
+          <a:p>
+            <a:r>
+              <a:rPr lang="en-US" dirty="0"/>
+              <a:t>Extreme weather (hurricanes, tornadoes, cyclones)</a:t>
+            </a:r>
+          </a:p>
+          <a:p>
+            <a:pPr marL="0" indent="0">
+              <a:buNone/>
+            </a:pPr>
+            <a:endParaRPr lang="en-US" dirty="0"/>
+          </a:p>
+          <a:p>
+            <a:r>
+              <a:rPr lang="en-US" dirty="0"/>
+              <a:t>Drought</a:t>
+            </a:r>
+          </a:p>
+          <a:p>
+            <a:pPr marL="0" indent="0">
+              <a:buNone/>
+            </a:pPr>
+            <a:endParaRPr lang="en-US" dirty="0"/>
+          </a:p>
+          <a:p>
+            <a:r>
+              <a:rPr lang="en-US" dirty="0"/>
+              <a:t>Flood</a:t>
+            </a:r>
+          </a:p>
+          <a:p>
+            <a:pPr marL="0" indent="0">
+              <a:buNone/>
+            </a:pPr>
+            <a:endParaRPr lang="en-US" dirty="0"/>
+          </a:p>
+          <a:p>
+            <a:r>
+              <a:rPr lang="en-US" dirty="0"/>
+              <a:t>Wildfire</a:t>
+            </a:r>
+          </a:p>
+        </p:txBody>
+      </p:sp>
     </p:spTree>
     <p:extLst>
       <p:ext uri="{BB962C8B-B14F-4D97-AF65-F5344CB8AC3E}">
-        <p14:creationId xmlns:p14="http://schemas.microsoft.com/office/powerpoint/2010/main" val="2035777424"/>
+        <p14:creationId xmlns:p14="http://schemas.microsoft.com/office/powerpoint/2010/main" val="56432343"/>
       </p:ext>
     </p:extLst>
   </p:cSld>
@@ -7798,7 +7948,7 @@
           <p:cNvPr id="2" name="Title 1">
             <a:extLst>
               <a:ext uri="{FF2B5EF4-FFF2-40B4-BE49-F238E27FC236}">
-                <a16:creationId xmlns:a16="http://schemas.microsoft.com/office/drawing/2014/main" id="{C5766DA3-48FF-4E77-AAA6-2636379B6F90}"/>
+                <a16:creationId xmlns:a16="http://schemas.microsoft.com/office/drawing/2014/main" id="{10EC273B-EA40-47EB-B6B9-190C5F1A3D07}"/>
               </a:ext>
             </a:extLst>
           </p:cNvPr>
@@ -7817,7 +7967,7 @@
             <a:pPr algn="ctr"/>
             <a:r>
               <a:rPr lang="en-US" dirty="0"/>
-              <a:t>Before and After 1950</a:t>
+              <a:t>Natural Disasters (1975-2019)</a:t>
             </a:r>
           </a:p>
         </p:txBody>
@@ -7827,7 +7977,7 @@
           <p:cNvPr id="15" name="Content Placeholder 14" descr="A close up of a map&#10;&#10;Description automatically generated">
             <a:extLst>
               <a:ext uri="{FF2B5EF4-FFF2-40B4-BE49-F238E27FC236}">
-                <a16:creationId xmlns:a16="http://schemas.microsoft.com/office/drawing/2014/main" id="{5FD5E326-FF77-4BEB-ACC8-B8EDDE29208A}"/>
+                <a16:creationId xmlns:a16="http://schemas.microsoft.com/office/drawing/2014/main" id="{3CFE6D1C-7D49-4AF6-950A-B4854F03EBB8}"/>
               </a:ext>
             </a:extLst>
           </p:cNvPr>
@@ -7835,7 +7985,7 @@
             <a:picLocks noGrp="1" noChangeAspect="1"/>
           </p:cNvPicPr>
           <p:nvPr>
-            <p:ph sz="half" idx="1"/>
+            <p:ph idx="1"/>
           </p:nvPr>
         </p:nvPicPr>
         <p:blipFill>
@@ -7852,50 +8002,15 @@
         </p:blipFill>
         <p:spPr>
           <a:xfrm>
-            <a:off x="333375" y="1853248"/>
-            <a:ext cx="5413373" cy="4461827"/>
-          </a:xfrm>
-        </p:spPr>
-      </p:pic>
-      <p:pic>
-        <p:nvPicPr>
-          <p:cNvPr id="17" name="Content Placeholder 16" descr="A close up of a map&#10;&#10;Description automatically generated">
-            <a:extLst>
-              <a:ext uri="{FF2B5EF4-FFF2-40B4-BE49-F238E27FC236}">
-                <a16:creationId xmlns:a16="http://schemas.microsoft.com/office/drawing/2014/main" id="{65353BD3-7339-4401-B830-035AF50AE156}"/>
-              </a:ext>
-            </a:extLst>
-          </p:cNvPr>
-          <p:cNvPicPr>
-            <a:picLocks noGrp="1" noChangeAspect="1"/>
-          </p:cNvPicPr>
-          <p:nvPr>
-            <p:ph sz="half" idx="2"/>
-          </p:nvPr>
-        </p:nvPicPr>
-        <p:blipFill>
-          <a:blip r:embed="rId3">
-            <a:extLst>
-              <a:ext uri="{28A0092B-C50C-407E-A947-70E740481C1C}">
-                <a14:useLocalDpi xmlns:a14="http://schemas.microsoft.com/office/drawing/2010/main" val="0"/>
-              </a:ext>
-            </a:extLst>
-          </a:blip>
-          <a:stretch>
-            <a:fillRect/>
-          </a:stretch>
-        </p:blipFill>
-        <p:spPr>
-          <a:xfrm>
-            <a:off x="6267635" y="1853248"/>
-            <a:ext cx="5590993" cy="4461826"/>
+            <a:off x="1103313" y="2259845"/>
+            <a:ext cx="8947150" cy="3781348"/>
           </a:xfrm>
         </p:spPr>
       </p:pic>
     </p:spTree>
     <p:extLst>
       <p:ext uri="{BB962C8B-B14F-4D97-AF65-F5344CB8AC3E}">
-        <p14:creationId xmlns:p14="http://schemas.microsoft.com/office/powerpoint/2010/main" val="3907210520"/>
+        <p14:creationId xmlns:p14="http://schemas.microsoft.com/office/powerpoint/2010/main" val="2035777424"/>
       </p:ext>
     </p:extLst>
   </p:cSld>

</xml_diff>